<commit_message>
update lec 3, add PCA-annimation
</commit_message>
<xml_diff>
--- a/lectures/lecture3.pptx
+++ b/lectures/lecture3.pptx
@@ -215,6 +215,18 @@
 </p:presentation>
 </file>
 
+<file path=ppt/commentAuthors.xml><?xml version="1.0" encoding="utf-8"?>
+<p:cmAuthorLst xmlns:a="http://schemas.openxmlformats.org/drawingml/2006/main" xmlns:r="http://schemas.openxmlformats.org/officeDocument/2006/relationships" xmlns:p="http://schemas.openxmlformats.org/presentationml/2006/main">
+  <p:cmAuthor id="1" name="Michael L Friendly" initials="MLF" lastIdx="1" clrIdx="0">
+    <p:extLst>
+      <p:ext uri="{19B8F6BF-5375-455C-9EA6-DF929625EA0E}">
+        <p15:presenceInfo xmlns:p15="http://schemas.microsoft.com/office/powerpoint/2012/main" userId="Michael L Friendly" providerId="None"/>
+      </p:ext>
+    </p:extLst>
+  </p:cmAuthor>
+</p:cmAuthorLst>
+</file>
+
 <file path=ppt/notesMasters/notesMaster1.xml><?xml version="1.0" encoding="utf-8"?>
 <p:notesMaster xmlns:a="http://schemas.openxmlformats.org/drawingml/2006/main" xmlns:r="http://schemas.openxmlformats.org/officeDocument/2006/relationships" xmlns:p="http://schemas.openxmlformats.org/presentationml/2006/main">
   <p:cSld>
@@ -297,7 +309,7 @@
           <a:p>
             <a:fld id="{88225CEC-B4DB-421E-BD7D-F5D0F79EA658}" type="datetimeFigureOut">
               <a:rPr lang="en-US" smtClean="0"/>
-              <a:t>2/6/2021</a:t>
+              <a:t>3/13/2021</a:t>
             </a:fld>
             <a:endParaRPr lang="en-US"/>
           </a:p>
@@ -911,7 +923,7 @@
           <a:p>
             <a:fld id="{2F895662-E2E6-47BC-B493-3EA4FCF734B6}" type="datetime1">
               <a:rPr lang="en-US" smtClean="0"/>
-              <a:t>2/6/2021</a:t>
+              <a:t>3/13/2021</a:t>
             </a:fld>
             <a:endParaRPr lang="en-US"/>
           </a:p>
@@ -1079,7 +1091,7 @@
           <a:p>
             <a:fld id="{0F4BFD65-5602-4172-B54C-6A65165A1845}" type="datetime1">
               <a:rPr lang="en-US" smtClean="0"/>
-              <a:t>2/6/2021</a:t>
+              <a:t>3/13/2021</a:t>
             </a:fld>
             <a:endParaRPr lang="en-US"/>
           </a:p>
@@ -1257,7 +1269,7 @@
           <a:p>
             <a:fld id="{6CA290DE-8138-4626-BC3F-DF68A3BD09D8}" type="datetime1">
               <a:rPr lang="en-US" smtClean="0"/>
-              <a:t>2/6/2021</a:t>
+              <a:t>3/13/2021</a:t>
             </a:fld>
             <a:endParaRPr lang="en-US"/>
           </a:p>
@@ -1425,7 +1437,7 @@
           <a:p>
             <a:fld id="{E1BE8E3F-75DF-45E8-9F6B-4F2E22494A32}" type="datetime1">
               <a:rPr lang="en-US" smtClean="0"/>
-              <a:t>2/6/2021</a:t>
+              <a:t>3/13/2021</a:t>
             </a:fld>
             <a:endParaRPr lang="en-US"/>
           </a:p>
@@ -1670,7 +1682,7 @@
           <a:p>
             <a:fld id="{82F4DA82-3E7C-4CFB-A30B-53D3893EF32E}" type="datetime1">
               <a:rPr lang="en-US" smtClean="0"/>
-              <a:t>2/6/2021</a:t>
+              <a:t>3/13/2021</a:t>
             </a:fld>
             <a:endParaRPr lang="en-US"/>
           </a:p>
@@ -1955,7 +1967,7 @@
           <a:p>
             <a:fld id="{36B3D8AD-4C83-4D73-AEE7-5E801ED5356C}" type="datetime1">
               <a:rPr lang="en-US" smtClean="0"/>
-              <a:t>2/6/2021</a:t>
+              <a:t>3/13/2021</a:t>
             </a:fld>
             <a:endParaRPr lang="en-US"/>
           </a:p>
@@ -2374,7 +2386,7 @@
           <a:p>
             <a:fld id="{7E6893DB-DD64-49D6-A5C2-F6ACE2B1530B}" type="datetime1">
               <a:rPr lang="en-US" smtClean="0"/>
-              <a:t>2/6/2021</a:t>
+              <a:t>3/13/2021</a:t>
             </a:fld>
             <a:endParaRPr lang="en-US"/>
           </a:p>
@@ -2491,7 +2503,7 @@
           <a:p>
             <a:fld id="{FC0A94C3-7A0F-4E28-9A06-985C13FFBB01}" type="datetime1">
               <a:rPr lang="en-US" smtClean="0"/>
-              <a:t>2/6/2021</a:t>
+              <a:t>3/13/2021</a:t>
             </a:fld>
             <a:endParaRPr lang="en-US"/>
           </a:p>
@@ -2586,7 +2598,7 @@
           <a:p>
             <a:fld id="{8587B2D3-0011-41C0-B2C5-6B713844DB1C}" type="datetime1">
               <a:rPr lang="en-US" smtClean="0"/>
-              <a:t>2/6/2021</a:t>
+              <a:t>3/13/2021</a:t>
             </a:fld>
             <a:endParaRPr lang="en-US"/>
           </a:p>
@@ -2861,7 +2873,7 @@
           <a:p>
             <a:fld id="{B53EE19A-9EFD-417C-93CE-FC2F485F3533}" type="datetime1">
               <a:rPr lang="en-US" smtClean="0"/>
-              <a:t>2/6/2021</a:t>
+              <a:t>3/13/2021</a:t>
             </a:fld>
             <a:endParaRPr lang="en-US"/>
           </a:p>
@@ -3116,7 +3128,7 @@
           <a:p>
             <a:fld id="{87D9954C-8CD1-4968-8DFE-C7948C62F830}" type="datetime1">
               <a:rPr lang="en-US" smtClean="0"/>
-              <a:t>2/6/2021</a:t>
+              <a:t>3/13/2021</a:t>
             </a:fld>
             <a:endParaRPr lang="en-US"/>
           </a:p>
@@ -3332,7 +3344,7 @@
           <a:p>
             <a:fld id="{B4BF092D-FE75-4F27-B0C3-A897761F708C}" type="datetime1">
               <a:rPr lang="en-US" smtClean="0"/>
-              <a:t>2/6/2021</a:t>
+              <a:t>3/13/2021</a:t>
             </a:fld>
             <a:endParaRPr lang="en-US"/>
           </a:p>
@@ -4846,6 +4858,158 @@
   <p:clrMapOvr>
     <a:masterClrMapping/>
   </p:clrMapOvr>
+  <p:timing>
+    <p:tnLst>
+      <p:par>
+        <p:cTn id="1" dur="indefinite" restart="never" nodeType="tmRoot">
+          <p:childTnLst>
+            <p:seq concurrent="1" nextAc="seek">
+              <p:cTn id="2" dur="indefinite" nodeType="mainSeq">
+                <p:childTnLst>
+                  <p:par>
+                    <p:cTn id="3" fill="hold">
+                      <p:stCondLst>
+                        <p:cond delay="indefinite"/>
+                      </p:stCondLst>
+                      <p:childTnLst>
+                        <p:par>
+                          <p:cTn id="4" fill="hold">
+                            <p:stCondLst>
+                              <p:cond delay="0"/>
+                            </p:stCondLst>
+                            <p:childTnLst>
+                              <p:par>
+                                <p:cTn id="5" presetID="1" presetClass="entr" presetSubtype="0" fill="hold" grpId="0" nodeType="clickEffect">
+                                  <p:stCondLst>
+                                    <p:cond delay="0"/>
+                                  </p:stCondLst>
+                                  <p:childTnLst>
+                                    <p:set>
+                                      <p:cBhvr>
+                                        <p:cTn id="6" dur="1" fill="hold">
+                                          <p:stCondLst>
+                                            <p:cond delay="0"/>
+                                          </p:stCondLst>
+                                        </p:cTn>
+                                        <p:tgtEl>
+                                          <p:spTgt spid="4"/>
+                                        </p:tgtEl>
+                                        <p:attrNameLst>
+                                          <p:attrName>style.visibility</p:attrName>
+                                        </p:attrNameLst>
+                                      </p:cBhvr>
+                                      <p:to>
+                                        <p:strVal val="visible"/>
+                                      </p:to>
+                                    </p:set>
+                                  </p:childTnLst>
+                                </p:cTn>
+                              </p:par>
+                            </p:childTnLst>
+                          </p:cTn>
+                        </p:par>
+                      </p:childTnLst>
+                    </p:cTn>
+                  </p:par>
+                  <p:par>
+                    <p:cTn id="7" fill="hold">
+                      <p:stCondLst>
+                        <p:cond delay="indefinite"/>
+                      </p:stCondLst>
+                      <p:childTnLst>
+                        <p:par>
+                          <p:cTn id="8" fill="hold">
+                            <p:stCondLst>
+                              <p:cond delay="0"/>
+                            </p:stCondLst>
+                            <p:childTnLst>
+                              <p:par>
+                                <p:cTn id="9" presetID="1" presetClass="entr" presetSubtype="0" fill="hold" grpId="0" nodeType="clickEffect">
+                                  <p:stCondLst>
+                                    <p:cond delay="0"/>
+                                  </p:stCondLst>
+                                  <p:childTnLst>
+                                    <p:set>
+                                      <p:cBhvr>
+                                        <p:cTn id="10" dur="1" fill="hold">
+                                          <p:stCondLst>
+                                            <p:cond delay="0"/>
+                                          </p:stCondLst>
+                                        </p:cTn>
+                                        <p:tgtEl>
+                                          <p:spTgt spid="5"/>
+                                        </p:tgtEl>
+                                        <p:attrNameLst>
+                                          <p:attrName>style.visibility</p:attrName>
+                                        </p:attrNameLst>
+                                      </p:cBhvr>
+                                      <p:to>
+                                        <p:strVal val="visible"/>
+                                      </p:to>
+                                    </p:set>
+                                  </p:childTnLst>
+                                </p:cTn>
+                              </p:par>
+                              <p:par>
+                                <p:cTn id="11" presetID="1" presetClass="entr" presetSubtype="0" fill="hold" grpId="0" nodeType="withEffect">
+                                  <p:stCondLst>
+                                    <p:cond delay="0"/>
+                                  </p:stCondLst>
+                                  <p:childTnLst>
+                                    <p:set>
+                                      <p:cBhvr>
+                                        <p:cTn id="12" dur="1" fill="hold">
+                                          <p:stCondLst>
+                                            <p:cond delay="0"/>
+                                          </p:stCondLst>
+                                        </p:cTn>
+                                        <p:tgtEl>
+                                          <p:spTgt spid="6"/>
+                                        </p:tgtEl>
+                                        <p:attrNameLst>
+                                          <p:attrName>style.visibility</p:attrName>
+                                        </p:attrNameLst>
+                                      </p:cBhvr>
+                                      <p:to>
+                                        <p:strVal val="visible"/>
+                                      </p:to>
+                                    </p:set>
+                                  </p:childTnLst>
+                                </p:cTn>
+                              </p:par>
+                            </p:childTnLst>
+                          </p:cTn>
+                        </p:par>
+                      </p:childTnLst>
+                    </p:cTn>
+                  </p:par>
+                </p:childTnLst>
+              </p:cTn>
+              <p:prevCondLst>
+                <p:cond evt="onPrev" delay="0">
+                  <p:tgtEl>
+                    <p:sldTgt/>
+                  </p:tgtEl>
+                </p:cond>
+              </p:prevCondLst>
+              <p:nextCondLst>
+                <p:cond evt="onNext" delay="0">
+                  <p:tgtEl>
+                    <p:sldTgt/>
+                  </p:tgtEl>
+                </p:cond>
+              </p:nextCondLst>
+            </p:seq>
+          </p:childTnLst>
+        </p:cTn>
+      </p:par>
+    </p:tnLst>
+    <p:bldLst>
+      <p:bldP spid="4" grpId="0" animBg="1"/>
+      <p:bldP spid="5" grpId="0" animBg="1"/>
+      <p:bldP spid="6" grpId="0" animBg="1"/>
+    </p:bldLst>
+  </p:timing>
 </p:sld>
 </file>
 
@@ -5693,7 +5857,7 @@
         <p:spPr>
           <a:xfrm>
             <a:off x="6400800" y="2895600"/>
-            <a:ext cx="2286000" cy="1200329"/>
+            <a:ext cx="2362200" cy="2031325"/>
           </a:xfrm>
           <a:prstGeom prst="rect">
             <a:avLst/>
@@ -5718,6 +5882,39 @@
             <a:r>
               <a:rPr lang="en-US" dirty="0"/>
               <a:t>Can2: Schizoaffective vs. others</a:t>
+            </a:r>
+          </a:p>
+          <a:p>
+            <a:endParaRPr lang="en-US" dirty="0"/>
+          </a:p>
+          <a:p>
+            <a:r>
+              <a:rPr lang="en-US" dirty="0"/>
+              <a:t>Dx1 suggests </a:t>
+            </a:r>
+            <a:r>
+              <a:rPr lang="en-US" dirty="0">
+                <a:sym typeface="Symbol" panose="05050102010706020507" pitchFamily="18" charset="2"/>
+              </a:rPr>
+              <a:t> spacing</a:t>
+            </a:r>
+          </a:p>
+          <a:p>
+            <a:r>
+              <a:rPr lang="en-US" dirty="0" err="1"/>
+              <a:t>Schizo</a:t>
+            </a:r>
+            <a:r>
+              <a:rPr lang="en-US" dirty="0"/>
+              <a:t> &lt; </a:t>
+            </a:r>
+            <a:r>
+              <a:rPr lang="en-US" dirty="0" err="1"/>
+              <a:t>ScAff</a:t>
+            </a:r>
+            <a:r>
+              <a:rPr lang="en-US" dirty="0"/>
+              <a:t> &lt; Control</a:t>
             </a:r>
           </a:p>
         </p:txBody>
@@ -7114,7 +7311,7 @@
           <a:graphicData uri="http://schemas.openxmlformats.org/presentationml/2006/ole">
             <mc:AlternateContent xmlns:mc="http://schemas.openxmlformats.org/markup-compatibility/2006">
               <mc:Choice xmlns:v="urn:schemas-microsoft-com:vml" Requires="v">
-                <p:oleObj spid="_x0000_s1061" name="Equation" r:id="rId3" imgW="2070000" imgH="253800" progId="Equation.DSMT4">
+                <p:oleObj spid="_x0000_s1064" name="Equation" r:id="rId3" imgW="2070000" imgH="253800" progId="Equation.DSMT4">
                   <p:embed/>
                 </p:oleObj>
               </mc:Choice>
@@ -7299,7 +7496,7 @@
         <p:spPr>
           <a:xfrm>
             <a:off x="457200" y="1219200"/>
-            <a:ext cx="6553200" cy="646331"/>
+            <a:ext cx="8153400" cy="646331"/>
           </a:xfrm>
           <a:prstGeom prst="rect">
             <a:avLst/>
@@ -7648,6 +7845,53 @@
               <a:rPr lang="en-US" dirty="0"/>
               <a:t> test of Dx2 in robust model</a:t>
             </a:r>
+          </a:p>
+        </p:txBody>
+      </p:sp>
+      <p:sp>
+        <p:nvSpPr>
+          <p:cNvPr id="7" name="Oval 6">
+            <a:extLst>
+              <a:ext uri="{FF2B5EF4-FFF2-40B4-BE49-F238E27FC236}">
+                <a16:creationId xmlns:a16="http://schemas.microsoft.com/office/drawing/2014/main" id="{A4873F67-9996-4BAB-9873-EE845B408E20}"/>
+              </a:ext>
+            </a:extLst>
+          </p:cNvPr>
+          <p:cNvSpPr/>
+          <p:nvPr/>
+        </p:nvSpPr>
+        <p:spPr>
+          <a:xfrm>
+            <a:off x="838200" y="5372100"/>
+            <a:ext cx="533400" cy="533400"/>
+          </a:xfrm>
+          <a:prstGeom prst="ellipse">
+            <a:avLst/>
+          </a:prstGeom>
+          <a:noFill/>
+        </p:spPr>
+        <p:style>
+          <a:lnRef idx="2">
+            <a:schemeClr val="accent1">
+              <a:shade val="50000"/>
+            </a:schemeClr>
+          </a:lnRef>
+          <a:fillRef idx="1">
+            <a:schemeClr val="accent1"/>
+          </a:fillRef>
+          <a:effectRef idx="0">
+            <a:schemeClr val="accent1"/>
+          </a:effectRef>
+          <a:fontRef idx="minor">
+            <a:schemeClr val="lt1"/>
+          </a:fontRef>
+        </p:style>
+        <p:txBody>
+          <a:bodyPr rtlCol="0" anchor="ctr"/>
+          <a:lstStyle/>
+          <a:p>
+            <a:pPr algn="ctr"/>
+            <a:endParaRPr lang="en-US"/>
           </a:p>
         </p:txBody>
       </p:sp>
@@ -9304,534 +9548,6 @@
       </p:sp>
       <p:sp>
         <p:nvSpPr>
-          <p:cNvPr id="4" name="TextBox 3"/>
-          <p:cNvSpPr txBox="1"/>
-          <p:nvPr/>
-        </p:nvSpPr>
-        <p:spPr>
-          <a:xfrm>
-            <a:off x="457200" y="1371600"/>
-            <a:ext cx="8229600" cy="2308324"/>
-          </a:xfrm>
-          <a:prstGeom prst="rect">
-            <a:avLst/>
-          </a:prstGeom>
-          <a:solidFill>
-            <a:srgbClr val="FFFF00">
-              <a:alpha val="15000"/>
-            </a:srgbClr>
-          </a:solidFill>
-        </p:spPr>
-        <p:txBody>
-          <a:bodyPr wrap="square" rtlCol="0">
-            <a:spAutoFit/>
-          </a:bodyPr>
-          <a:lstStyle/>
-          <a:p>
-            <a:r>
-              <a:rPr lang="en-US" sz="1200" dirty="0">
-                <a:latin typeface="Lucida Console" pitchFamily="49" charset="0"/>
-              </a:rPr>
-              <a:t>&gt; </a:t>
-            </a:r>
-            <a:r>
-              <a:rPr lang="en-US" sz="1200" dirty="0" err="1">
-                <a:latin typeface="Lucida Console" pitchFamily="49" charset="0"/>
-              </a:rPr>
-              <a:t>rohwer.mlm</a:t>
-            </a:r>
-            <a:r>
-              <a:rPr lang="en-US" sz="1200" dirty="0">
-                <a:latin typeface="Lucida Console" pitchFamily="49" charset="0"/>
-              </a:rPr>
-              <a:t> &lt;- lm(</a:t>
-            </a:r>
-            <a:r>
-              <a:rPr lang="en-US" sz="1200" dirty="0" err="1">
-                <a:latin typeface="Lucida Console" pitchFamily="49" charset="0"/>
-              </a:rPr>
-              <a:t>cbind</a:t>
-            </a:r>
-            <a:r>
-              <a:rPr lang="en-US" sz="1200" dirty="0">
-                <a:latin typeface="Lucida Console" pitchFamily="49" charset="0"/>
-              </a:rPr>
-              <a:t>(SAT, PPVT, Raven) ~ n + s + ns + </a:t>
-            </a:r>
-            <a:r>
-              <a:rPr lang="en-US" sz="1200" dirty="0" err="1">
-                <a:latin typeface="Lucida Console" pitchFamily="49" charset="0"/>
-              </a:rPr>
-              <a:t>na</a:t>
-            </a:r>
-            <a:r>
-              <a:rPr lang="en-US" sz="1200" dirty="0">
-                <a:latin typeface="Lucida Console" pitchFamily="49" charset="0"/>
-              </a:rPr>
-              <a:t> + </a:t>
-            </a:r>
-            <a:r>
-              <a:rPr lang="en-US" sz="1200" dirty="0" err="1">
-                <a:latin typeface="Lucida Console" pitchFamily="49" charset="0"/>
-              </a:rPr>
-              <a:t>ss</a:t>
-            </a:r>
-            <a:r>
-              <a:rPr lang="en-US" sz="1200" dirty="0">
-                <a:latin typeface="Lucida Console" pitchFamily="49" charset="0"/>
-              </a:rPr>
-              <a:t>, data=Rohwer2)</a:t>
-            </a:r>
-          </a:p>
-          <a:p>
-            <a:r>
-              <a:rPr lang="en-US" sz="1200" dirty="0">
-                <a:latin typeface="Lucida Console" pitchFamily="49" charset="0"/>
-              </a:rPr>
-              <a:t>&gt; </a:t>
-            </a:r>
-            <a:r>
-              <a:rPr lang="en-US" sz="1200" dirty="0" err="1">
-                <a:latin typeface="Lucida Console" pitchFamily="49" charset="0"/>
-              </a:rPr>
-              <a:t>Anova</a:t>
-            </a:r>
-            <a:r>
-              <a:rPr lang="en-US" sz="1200" dirty="0">
-                <a:latin typeface="Lucida Console" pitchFamily="49" charset="0"/>
-              </a:rPr>
-              <a:t>(</a:t>
-            </a:r>
-            <a:r>
-              <a:rPr lang="en-US" sz="1200" dirty="0" err="1">
-                <a:latin typeface="Lucida Console" pitchFamily="49" charset="0"/>
-              </a:rPr>
-              <a:t>rohwer.mlm</a:t>
-            </a:r>
-            <a:r>
-              <a:rPr lang="en-US" sz="1200" dirty="0">
-                <a:latin typeface="Lucida Console" pitchFamily="49" charset="0"/>
-              </a:rPr>
-              <a:t>)</a:t>
-            </a:r>
-          </a:p>
-          <a:p>
-            <a:endParaRPr lang="en-US" sz="1200" dirty="0">
-              <a:latin typeface="Lucida Console" pitchFamily="49" charset="0"/>
-            </a:endParaRPr>
-          </a:p>
-          <a:p>
-            <a:r>
-              <a:rPr lang="en-US" sz="1200" dirty="0">
-                <a:latin typeface="Lucida Console" pitchFamily="49" charset="0"/>
-              </a:rPr>
-              <a:t>Type II MANOVA Tests: </a:t>
-            </a:r>
-            <a:r>
-              <a:rPr lang="en-US" sz="1200" dirty="0" err="1">
-                <a:latin typeface="Lucida Console" pitchFamily="49" charset="0"/>
-              </a:rPr>
-              <a:t>Pillai</a:t>
-            </a:r>
-            <a:r>
-              <a:rPr lang="en-US" sz="1200" dirty="0">
-                <a:latin typeface="Lucida Console" pitchFamily="49" charset="0"/>
-              </a:rPr>
-              <a:t> test statistic</a:t>
-            </a:r>
-          </a:p>
-          <a:p>
-            <a:r>
-              <a:rPr lang="en-US" sz="1200" dirty="0">
-                <a:latin typeface="Lucida Console" pitchFamily="49" charset="0"/>
-              </a:rPr>
-              <a:t>   </a:t>
-            </a:r>
-            <a:r>
-              <a:rPr lang="en-US" sz="1200" dirty="0" err="1">
-                <a:latin typeface="Lucida Console" pitchFamily="49" charset="0"/>
-              </a:rPr>
-              <a:t>Df</a:t>
-            </a:r>
-            <a:r>
-              <a:rPr lang="en-US" sz="1200" dirty="0">
-                <a:latin typeface="Lucida Console" pitchFamily="49" charset="0"/>
-              </a:rPr>
-              <a:t> test stat </a:t>
-            </a:r>
-            <a:r>
-              <a:rPr lang="en-US" sz="1200" dirty="0" err="1">
-                <a:latin typeface="Lucida Console" pitchFamily="49" charset="0"/>
-              </a:rPr>
-              <a:t>approx</a:t>
-            </a:r>
-            <a:r>
-              <a:rPr lang="en-US" sz="1200" dirty="0">
-                <a:latin typeface="Lucida Console" pitchFamily="49" charset="0"/>
-              </a:rPr>
-              <a:t> F </a:t>
-            </a:r>
-            <a:r>
-              <a:rPr lang="en-US" sz="1200" dirty="0" err="1">
-                <a:latin typeface="Lucida Console" pitchFamily="49" charset="0"/>
-              </a:rPr>
-              <a:t>num</a:t>
-            </a:r>
-            <a:r>
-              <a:rPr lang="en-US" sz="1200" dirty="0">
-                <a:latin typeface="Lucida Console" pitchFamily="49" charset="0"/>
-              </a:rPr>
-              <a:t> </a:t>
-            </a:r>
-            <a:r>
-              <a:rPr lang="en-US" sz="1200" dirty="0" err="1">
-                <a:latin typeface="Lucida Console" pitchFamily="49" charset="0"/>
-              </a:rPr>
-              <a:t>Df</a:t>
-            </a:r>
-            <a:r>
-              <a:rPr lang="en-US" sz="1200" dirty="0">
-                <a:latin typeface="Lucida Console" pitchFamily="49" charset="0"/>
-              </a:rPr>
-              <a:t> den </a:t>
-            </a:r>
-            <a:r>
-              <a:rPr lang="en-US" sz="1200" dirty="0" err="1">
-                <a:latin typeface="Lucida Console" pitchFamily="49" charset="0"/>
-              </a:rPr>
-              <a:t>Df</a:t>
-            </a:r>
-            <a:r>
-              <a:rPr lang="en-US" sz="1200" dirty="0">
-                <a:latin typeface="Lucida Console" pitchFamily="49" charset="0"/>
-              </a:rPr>
-              <a:t> </a:t>
-            </a:r>
-            <a:r>
-              <a:rPr lang="en-US" sz="1200" dirty="0" err="1">
-                <a:latin typeface="Lucida Console" pitchFamily="49" charset="0"/>
-              </a:rPr>
-              <a:t>Pr</a:t>
-            </a:r>
-            <a:r>
-              <a:rPr lang="en-US" sz="1200" dirty="0">
-                <a:latin typeface="Lucida Console" pitchFamily="49" charset="0"/>
-              </a:rPr>
-              <a:t>(&gt;F)   </a:t>
-            </a:r>
-          </a:p>
-          <a:p>
-            <a:r>
-              <a:rPr lang="en-US" sz="1200" dirty="0">
-                <a:latin typeface="Lucida Console" pitchFamily="49" charset="0"/>
-              </a:rPr>
-              <a:t>n   1     0.202     2.02      3     24 0.1376   </a:t>
-            </a:r>
-          </a:p>
-          <a:p>
-            <a:r>
-              <a:rPr lang="en-US" sz="1200" dirty="0">
-                <a:latin typeface="Lucida Console" pitchFamily="49" charset="0"/>
-              </a:rPr>
-              <a:t>s   1     0.310     3.59      3     24 0.0284 * </a:t>
-            </a:r>
-          </a:p>
-          <a:p>
-            <a:r>
-              <a:rPr lang="en-US" sz="1200" dirty="0">
-                <a:latin typeface="Lucida Console" pitchFamily="49" charset="0"/>
-              </a:rPr>
-              <a:t>ns  1     0.358     4.46      3     24 0.0126 * </a:t>
-            </a:r>
-          </a:p>
-          <a:p>
-            <a:r>
-              <a:rPr lang="en-US" sz="1200" dirty="0" err="1">
-                <a:latin typeface="Lucida Console" pitchFamily="49" charset="0"/>
-              </a:rPr>
-              <a:t>na</a:t>
-            </a:r>
-            <a:r>
-              <a:rPr lang="en-US" sz="1200" dirty="0">
-                <a:latin typeface="Lucida Console" pitchFamily="49" charset="0"/>
-              </a:rPr>
-              <a:t>  1     0.465     6.96      3     24 0.0016 **</a:t>
-            </a:r>
-          </a:p>
-          <a:p>
-            <a:r>
-              <a:rPr lang="en-US" sz="1200" dirty="0" err="1">
-                <a:latin typeface="Lucida Console" pitchFamily="49" charset="0"/>
-              </a:rPr>
-              <a:t>ss</a:t>
-            </a:r>
-            <a:r>
-              <a:rPr lang="en-US" sz="1200" dirty="0">
-                <a:latin typeface="Lucida Console" pitchFamily="49" charset="0"/>
-              </a:rPr>
-              <a:t>  1     0.089     0.78      3     24 0.5173   </a:t>
-            </a:r>
-          </a:p>
-          <a:p>
-            <a:r>
-              <a:rPr lang="en-US" sz="1200" dirty="0">
-                <a:latin typeface="Lucida Console" pitchFamily="49" charset="0"/>
-              </a:rPr>
-              <a:t>---</a:t>
-            </a:r>
-          </a:p>
-          <a:p>
-            <a:r>
-              <a:rPr lang="en-US" sz="1200" dirty="0" err="1">
-                <a:latin typeface="Lucida Console" pitchFamily="49" charset="0"/>
-              </a:rPr>
-              <a:t>Signif</a:t>
-            </a:r>
-            <a:r>
-              <a:rPr lang="en-US" sz="1200" dirty="0">
-                <a:latin typeface="Lucida Console" pitchFamily="49" charset="0"/>
-              </a:rPr>
-              <a:t>. codes:  0 ‘***’ 0.001 ‘**’ 0.01 ‘*’ 0.05 ‘.’ 0.1 ‘ ’ 1</a:t>
-            </a:r>
-          </a:p>
-        </p:txBody>
-      </p:sp>
-      <p:sp>
-        <p:nvSpPr>
-          <p:cNvPr id="5" name="TextBox 4"/>
-          <p:cNvSpPr txBox="1"/>
-          <p:nvPr/>
-        </p:nvSpPr>
-        <p:spPr>
-          <a:xfrm>
-            <a:off x="527538" y="4753680"/>
-            <a:ext cx="7772400" cy="1754326"/>
-          </a:xfrm>
-          <a:prstGeom prst="rect">
-            <a:avLst/>
-          </a:prstGeom>
-          <a:solidFill>
-            <a:srgbClr val="FFFF00">
-              <a:alpha val="10000"/>
-            </a:srgbClr>
-          </a:solidFill>
-        </p:spPr>
-        <p:txBody>
-          <a:bodyPr wrap="square" rtlCol="0">
-            <a:spAutoFit/>
-          </a:bodyPr>
-          <a:lstStyle/>
-          <a:p>
-            <a:r>
-              <a:rPr lang="en-US" sz="1200" dirty="0">
-                <a:latin typeface="Lucida Console" pitchFamily="49" charset="0"/>
-              </a:rPr>
-              <a:t>&gt; print(</a:t>
-            </a:r>
-            <a:r>
-              <a:rPr lang="en-US" sz="1200" dirty="0" err="1">
-                <a:latin typeface="Lucida Console" pitchFamily="49" charset="0"/>
-              </a:rPr>
-              <a:t>linearHypothesis</a:t>
-            </a:r>
-            <a:r>
-              <a:rPr lang="en-US" sz="1200" dirty="0">
-                <a:latin typeface="Lucida Console" pitchFamily="49" charset="0"/>
-              </a:rPr>
-              <a:t>(</a:t>
-            </a:r>
-            <a:r>
-              <a:rPr lang="en-US" sz="1200" dirty="0" err="1">
-                <a:latin typeface="Lucida Console" pitchFamily="49" charset="0"/>
-              </a:rPr>
-              <a:t>rohwer.mlm</a:t>
-            </a:r>
-            <a:r>
-              <a:rPr lang="en-US" sz="1200" dirty="0">
-                <a:latin typeface="Lucida Console" pitchFamily="49" charset="0"/>
-              </a:rPr>
-              <a:t>, </a:t>
-            </a:r>
-          </a:p>
-          <a:p>
-            <a:r>
-              <a:rPr lang="en-US" sz="1200" dirty="0">
-                <a:latin typeface="Lucida Console" pitchFamily="49" charset="0"/>
-              </a:rPr>
-              <a:t>+                        c("n", "s", "ns", "</a:t>
-            </a:r>
-            <a:r>
-              <a:rPr lang="en-US" sz="1200" dirty="0" err="1">
-                <a:latin typeface="Lucida Console" pitchFamily="49" charset="0"/>
-              </a:rPr>
-              <a:t>na</a:t>
-            </a:r>
-            <a:r>
-              <a:rPr lang="en-US" sz="1200" dirty="0">
-                <a:latin typeface="Lucida Console" pitchFamily="49" charset="0"/>
-              </a:rPr>
-              <a:t>", "</a:t>
-            </a:r>
-            <a:r>
-              <a:rPr lang="en-US" sz="1200" dirty="0" err="1">
-                <a:latin typeface="Lucida Console" pitchFamily="49" charset="0"/>
-              </a:rPr>
-              <a:t>ss</a:t>
-            </a:r>
-            <a:r>
-              <a:rPr lang="en-US" sz="1200" dirty="0">
-                <a:latin typeface="Lucida Console" pitchFamily="49" charset="0"/>
-              </a:rPr>
-              <a:t>")), SSP=FALSE)</a:t>
-            </a:r>
-          </a:p>
-          <a:p>
-            <a:endParaRPr lang="en-US" sz="1200" dirty="0">
-              <a:latin typeface="Lucida Console" pitchFamily="49" charset="0"/>
-            </a:endParaRPr>
-          </a:p>
-          <a:p>
-            <a:r>
-              <a:rPr lang="en-US" sz="1200" dirty="0">
-                <a:latin typeface="Lucida Console" pitchFamily="49" charset="0"/>
-              </a:rPr>
-              <a:t>Multivariate Tests: </a:t>
-            </a:r>
-          </a:p>
-          <a:p>
-            <a:r>
-              <a:rPr lang="en-US" sz="1200" dirty="0">
-                <a:latin typeface="Lucida Console" pitchFamily="49" charset="0"/>
-              </a:rPr>
-              <a:t>                 </a:t>
-            </a:r>
-            <a:r>
-              <a:rPr lang="en-US" sz="1200" dirty="0" err="1">
-                <a:latin typeface="Lucida Console" pitchFamily="49" charset="0"/>
-              </a:rPr>
-              <a:t>Df</a:t>
-            </a:r>
-            <a:r>
-              <a:rPr lang="en-US" sz="1200" dirty="0">
-                <a:latin typeface="Lucida Console" pitchFamily="49" charset="0"/>
-              </a:rPr>
-              <a:t> test stat </a:t>
-            </a:r>
-            <a:r>
-              <a:rPr lang="en-US" sz="1200" dirty="0" err="1">
-                <a:latin typeface="Lucida Console" pitchFamily="49" charset="0"/>
-              </a:rPr>
-              <a:t>approx</a:t>
-            </a:r>
-            <a:r>
-              <a:rPr lang="en-US" sz="1200" dirty="0">
-                <a:latin typeface="Lucida Console" pitchFamily="49" charset="0"/>
-              </a:rPr>
-              <a:t> F </a:t>
-            </a:r>
-            <a:r>
-              <a:rPr lang="en-US" sz="1200" dirty="0" err="1">
-                <a:latin typeface="Lucida Console" pitchFamily="49" charset="0"/>
-              </a:rPr>
-              <a:t>num</a:t>
-            </a:r>
-            <a:r>
-              <a:rPr lang="en-US" sz="1200" dirty="0">
-                <a:latin typeface="Lucida Console" pitchFamily="49" charset="0"/>
-              </a:rPr>
-              <a:t> </a:t>
-            </a:r>
-            <a:r>
-              <a:rPr lang="en-US" sz="1200" dirty="0" err="1">
-                <a:latin typeface="Lucida Console" pitchFamily="49" charset="0"/>
-              </a:rPr>
-              <a:t>Df</a:t>
-            </a:r>
-            <a:r>
-              <a:rPr lang="en-US" sz="1200" dirty="0">
-                <a:latin typeface="Lucida Console" pitchFamily="49" charset="0"/>
-              </a:rPr>
-              <a:t> den </a:t>
-            </a:r>
-            <a:r>
-              <a:rPr lang="en-US" sz="1200" dirty="0" err="1">
-                <a:latin typeface="Lucida Console" pitchFamily="49" charset="0"/>
-              </a:rPr>
-              <a:t>Df</a:t>
-            </a:r>
-            <a:r>
-              <a:rPr lang="en-US" sz="1200" dirty="0">
-                <a:latin typeface="Lucida Console" pitchFamily="49" charset="0"/>
-              </a:rPr>
-              <a:t>   </a:t>
-            </a:r>
-            <a:r>
-              <a:rPr lang="en-US" sz="1200" dirty="0" err="1">
-                <a:latin typeface="Lucida Console" pitchFamily="49" charset="0"/>
-              </a:rPr>
-              <a:t>Pr</a:t>
-            </a:r>
-            <a:r>
-              <a:rPr lang="en-US" sz="1200" dirty="0">
-                <a:latin typeface="Lucida Console" pitchFamily="49" charset="0"/>
-              </a:rPr>
-              <a:t>(&gt;F)    </a:t>
-            </a:r>
-          </a:p>
-          <a:p>
-            <a:r>
-              <a:rPr lang="en-US" sz="1200" dirty="0" err="1">
-                <a:latin typeface="Lucida Console" pitchFamily="49" charset="0"/>
-              </a:rPr>
-              <a:t>Pillai</a:t>
-            </a:r>
-            <a:r>
-              <a:rPr lang="en-US" sz="1200" dirty="0">
-                <a:latin typeface="Lucida Console" pitchFamily="49" charset="0"/>
-              </a:rPr>
-              <a:t>            5    1.0386    2.753     15  78.00 0.001912 ** </a:t>
-            </a:r>
-          </a:p>
-          <a:p>
-            <a:r>
-              <a:rPr lang="en-US" sz="1200" dirty="0" err="1">
-                <a:latin typeface="Lucida Console" pitchFamily="49" charset="0"/>
-              </a:rPr>
-              <a:t>Wilks</a:t>
-            </a:r>
-            <a:r>
-              <a:rPr lang="en-US" sz="1200" dirty="0">
-                <a:latin typeface="Lucida Console" pitchFamily="49" charset="0"/>
-              </a:rPr>
-              <a:t>             5    0.2431    2.974     15  66.65 0.001154 ** </a:t>
-            </a:r>
-          </a:p>
-          <a:p>
-            <a:r>
-              <a:rPr lang="en-US" sz="1200" dirty="0" err="1">
-                <a:latin typeface="Lucida Console" pitchFamily="49" charset="0"/>
-              </a:rPr>
-              <a:t>Hotelling-Lawley</a:t>
-            </a:r>
-            <a:r>
-              <a:rPr lang="en-US" sz="1200" dirty="0">
-                <a:latin typeface="Lucida Console" pitchFamily="49" charset="0"/>
-              </a:rPr>
-              <a:t>  5    2.0615    3.115     15  68.00 0.000697 ***</a:t>
-            </a:r>
-          </a:p>
-          <a:p>
-            <a:r>
-              <a:rPr lang="en-US" sz="1200" dirty="0">
-                <a:latin typeface="Lucida Console" pitchFamily="49" charset="0"/>
-              </a:rPr>
-              <a:t>Roy               5    1.4654    7.620      5  26.00 0.000160 ***</a:t>
-            </a:r>
-          </a:p>
-        </p:txBody>
-      </p:sp>
-      <p:sp>
-        <p:nvSpPr>
           <p:cNvPr id="6" name="TextBox 5"/>
           <p:cNvSpPr txBox="1"/>
           <p:nvPr/>
@@ -9897,118 +9613,688 @@
           </a:p>
         </p:txBody>
       </p:sp>
-      <p:sp>
-        <p:nvSpPr>
-          <p:cNvPr id="7" name="TextBox 6"/>
-          <p:cNvSpPr txBox="1"/>
+      <p:grpSp>
+        <p:nvGrpSpPr>
+          <p:cNvPr id="10" name="Group 9">
+            <a:extLst>
+              <a:ext uri="{FF2B5EF4-FFF2-40B4-BE49-F238E27FC236}">
+                <a16:creationId xmlns:a16="http://schemas.microsoft.com/office/drawing/2014/main" id="{173C0EA0-8E9C-407A-BD91-F96E41923C3C}"/>
+              </a:ext>
+            </a:extLst>
+          </p:cNvPr>
+          <p:cNvGrpSpPr/>
           <p:nvPr/>
-        </p:nvSpPr>
-        <p:spPr>
+        </p:nvGrpSpPr>
+        <p:grpSpPr>
           <a:xfrm>
-            <a:off x="6553200" y="1837851"/>
-            <a:ext cx="2133600" cy="1477328"/>
+            <a:off x="457200" y="1371600"/>
+            <a:ext cx="8229600" cy="2308324"/>
+            <a:chOff x="457200" y="1371600"/>
+            <a:chExt cx="8229600" cy="2308324"/>
           </a:xfrm>
-          <a:prstGeom prst="rect">
-            <a:avLst/>
-          </a:prstGeom>
-          <a:solidFill>
-            <a:srgbClr val="FFFF00"/>
-          </a:solidFill>
-        </p:spPr>
-        <p:txBody>
-          <a:bodyPr wrap="square" rtlCol="0">
-            <a:spAutoFit/>
-          </a:bodyPr>
-          <a:lstStyle/>
-          <a:p>
-            <a:r>
-              <a:rPr lang="en-US" sz="1600" dirty="0"/>
-              <a:t>Much better!</a:t>
-            </a:r>
-          </a:p>
-          <a:p>
-            <a:endParaRPr lang="en-US" sz="1600" dirty="0"/>
-          </a:p>
-          <a:p>
-            <a:r>
-              <a:rPr lang="en-US" sz="1600" dirty="0"/>
-              <a:t>Multivariate tests:</a:t>
-            </a:r>
-          </a:p>
-          <a:p>
-            <a:pPr marL="285750" indent="-285750">
-              <a:buFont typeface="Arial" pitchFamily="34" charset="0"/>
-              <a:buChar char="•"/>
-            </a:pPr>
-            <a:r>
-              <a:rPr lang="en-US" sz="1400" dirty="0"/>
-              <a:t>pool evidence for all </a:t>
-            </a:r>
-            <a:r>
-              <a:rPr lang="en-US" sz="1400" dirty="0" err="1"/>
-              <a:t>Ys</a:t>
-            </a:r>
-            <a:endParaRPr lang="en-US" sz="1400" dirty="0"/>
-          </a:p>
-          <a:p>
-            <a:pPr marL="285750" indent="-285750">
-              <a:buFont typeface="Arial" pitchFamily="34" charset="0"/>
-              <a:buChar char="•"/>
-            </a:pPr>
-            <a:r>
-              <a:rPr lang="en-US" sz="1400" dirty="0"/>
-              <a:t>take correlations of </a:t>
-            </a:r>
-            <a:r>
-              <a:rPr lang="en-US" sz="1400" dirty="0" err="1"/>
-              <a:t>Ys</a:t>
-            </a:r>
-            <a:r>
-              <a:rPr lang="en-US" sz="1400" dirty="0"/>
-              <a:t> into account</a:t>
-            </a:r>
-          </a:p>
-        </p:txBody>
-      </p:sp>
-      <p:sp>
-        <p:nvSpPr>
-          <p:cNvPr id="8" name="TextBox 7"/>
-          <p:cNvSpPr txBox="1"/>
+        </p:grpSpPr>
+        <p:sp>
+          <p:nvSpPr>
+            <p:cNvPr id="4" name="TextBox 3"/>
+            <p:cNvSpPr txBox="1"/>
+            <p:nvPr/>
+          </p:nvSpPr>
+          <p:spPr>
+            <a:xfrm>
+              <a:off x="457200" y="1371600"/>
+              <a:ext cx="8229600" cy="2308324"/>
+            </a:xfrm>
+            <a:prstGeom prst="rect">
+              <a:avLst/>
+            </a:prstGeom>
+            <a:solidFill>
+              <a:srgbClr val="FFFF00">
+                <a:alpha val="15000"/>
+              </a:srgbClr>
+            </a:solidFill>
+          </p:spPr>
+          <p:txBody>
+            <a:bodyPr wrap="square" rtlCol="0">
+              <a:spAutoFit/>
+            </a:bodyPr>
+            <a:lstStyle/>
+            <a:p>
+              <a:r>
+                <a:rPr lang="en-US" sz="1200" dirty="0">
+                  <a:latin typeface="Lucida Console" pitchFamily="49" charset="0"/>
+                </a:rPr>
+                <a:t>&gt; </a:t>
+              </a:r>
+              <a:r>
+                <a:rPr lang="en-US" sz="1200" dirty="0" err="1">
+                  <a:latin typeface="Lucida Console" pitchFamily="49" charset="0"/>
+                </a:rPr>
+                <a:t>rohwer.mlm</a:t>
+              </a:r>
+              <a:r>
+                <a:rPr lang="en-US" sz="1200" dirty="0">
+                  <a:latin typeface="Lucida Console" pitchFamily="49" charset="0"/>
+                </a:rPr>
+                <a:t> &lt;- lm(</a:t>
+              </a:r>
+              <a:r>
+                <a:rPr lang="en-US" sz="1200" dirty="0" err="1">
+                  <a:latin typeface="Lucida Console" pitchFamily="49" charset="0"/>
+                </a:rPr>
+                <a:t>cbind</a:t>
+              </a:r>
+              <a:r>
+                <a:rPr lang="en-US" sz="1200" dirty="0">
+                  <a:latin typeface="Lucida Console" pitchFamily="49" charset="0"/>
+                </a:rPr>
+                <a:t>(SAT, PPVT, Raven) ~ n + s + ns + </a:t>
+              </a:r>
+              <a:r>
+                <a:rPr lang="en-US" sz="1200" dirty="0" err="1">
+                  <a:latin typeface="Lucida Console" pitchFamily="49" charset="0"/>
+                </a:rPr>
+                <a:t>na</a:t>
+              </a:r>
+              <a:r>
+                <a:rPr lang="en-US" sz="1200" dirty="0">
+                  <a:latin typeface="Lucida Console" pitchFamily="49" charset="0"/>
+                </a:rPr>
+                <a:t> + </a:t>
+              </a:r>
+              <a:r>
+                <a:rPr lang="en-US" sz="1200" dirty="0" err="1">
+                  <a:latin typeface="Lucida Console" pitchFamily="49" charset="0"/>
+                </a:rPr>
+                <a:t>ss</a:t>
+              </a:r>
+              <a:r>
+                <a:rPr lang="en-US" sz="1200" dirty="0">
+                  <a:latin typeface="Lucida Console" pitchFamily="49" charset="0"/>
+                </a:rPr>
+                <a:t>, data=Rohwer2)</a:t>
+              </a:r>
+            </a:p>
+            <a:p>
+              <a:r>
+                <a:rPr lang="en-US" sz="1200" dirty="0">
+                  <a:latin typeface="Lucida Console" pitchFamily="49" charset="0"/>
+                </a:rPr>
+                <a:t>&gt; </a:t>
+              </a:r>
+              <a:r>
+                <a:rPr lang="en-US" sz="1200" dirty="0" err="1">
+                  <a:latin typeface="Lucida Console" pitchFamily="49" charset="0"/>
+                </a:rPr>
+                <a:t>Anova</a:t>
+              </a:r>
+              <a:r>
+                <a:rPr lang="en-US" sz="1200" dirty="0">
+                  <a:latin typeface="Lucida Console" pitchFamily="49" charset="0"/>
+                </a:rPr>
+                <a:t>(</a:t>
+              </a:r>
+              <a:r>
+                <a:rPr lang="en-US" sz="1200" dirty="0" err="1">
+                  <a:latin typeface="Lucida Console" pitchFamily="49" charset="0"/>
+                </a:rPr>
+                <a:t>rohwer.mlm</a:t>
+              </a:r>
+              <a:r>
+                <a:rPr lang="en-US" sz="1200" dirty="0">
+                  <a:latin typeface="Lucida Console" pitchFamily="49" charset="0"/>
+                </a:rPr>
+                <a:t>)</a:t>
+              </a:r>
+            </a:p>
+            <a:p>
+              <a:endParaRPr lang="en-US" sz="1200" dirty="0">
+                <a:latin typeface="Lucida Console" pitchFamily="49" charset="0"/>
+              </a:endParaRPr>
+            </a:p>
+            <a:p>
+              <a:r>
+                <a:rPr lang="en-US" sz="1200" dirty="0">
+                  <a:latin typeface="Lucida Console" pitchFamily="49" charset="0"/>
+                </a:rPr>
+                <a:t>Type II MANOVA Tests: </a:t>
+              </a:r>
+              <a:r>
+                <a:rPr lang="en-US" sz="1200" dirty="0" err="1">
+                  <a:latin typeface="Lucida Console" pitchFamily="49" charset="0"/>
+                </a:rPr>
+                <a:t>Pillai</a:t>
+              </a:r>
+              <a:r>
+                <a:rPr lang="en-US" sz="1200" dirty="0">
+                  <a:latin typeface="Lucida Console" pitchFamily="49" charset="0"/>
+                </a:rPr>
+                <a:t> test statistic</a:t>
+              </a:r>
+            </a:p>
+            <a:p>
+              <a:r>
+                <a:rPr lang="en-US" sz="1200" dirty="0">
+                  <a:latin typeface="Lucida Console" pitchFamily="49" charset="0"/>
+                </a:rPr>
+                <a:t>   </a:t>
+              </a:r>
+              <a:r>
+                <a:rPr lang="en-US" sz="1200" dirty="0" err="1">
+                  <a:latin typeface="Lucida Console" pitchFamily="49" charset="0"/>
+                </a:rPr>
+                <a:t>Df</a:t>
+              </a:r>
+              <a:r>
+                <a:rPr lang="en-US" sz="1200" dirty="0">
+                  <a:latin typeface="Lucida Console" pitchFamily="49" charset="0"/>
+                </a:rPr>
+                <a:t> test stat </a:t>
+              </a:r>
+              <a:r>
+                <a:rPr lang="en-US" sz="1200" dirty="0" err="1">
+                  <a:latin typeface="Lucida Console" pitchFamily="49" charset="0"/>
+                </a:rPr>
+                <a:t>approx</a:t>
+              </a:r>
+              <a:r>
+                <a:rPr lang="en-US" sz="1200" dirty="0">
+                  <a:latin typeface="Lucida Console" pitchFamily="49" charset="0"/>
+                </a:rPr>
+                <a:t> F </a:t>
+              </a:r>
+              <a:r>
+                <a:rPr lang="en-US" sz="1200" dirty="0" err="1">
+                  <a:latin typeface="Lucida Console" pitchFamily="49" charset="0"/>
+                </a:rPr>
+                <a:t>num</a:t>
+              </a:r>
+              <a:r>
+                <a:rPr lang="en-US" sz="1200" dirty="0">
+                  <a:latin typeface="Lucida Console" pitchFamily="49" charset="0"/>
+                </a:rPr>
+                <a:t> </a:t>
+              </a:r>
+              <a:r>
+                <a:rPr lang="en-US" sz="1200" dirty="0" err="1">
+                  <a:latin typeface="Lucida Console" pitchFamily="49" charset="0"/>
+                </a:rPr>
+                <a:t>Df</a:t>
+              </a:r>
+              <a:r>
+                <a:rPr lang="en-US" sz="1200" dirty="0">
+                  <a:latin typeface="Lucida Console" pitchFamily="49" charset="0"/>
+                </a:rPr>
+                <a:t> den </a:t>
+              </a:r>
+              <a:r>
+                <a:rPr lang="en-US" sz="1200" dirty="0" err="1">
+                  <a:latin typeface="Lucida Console" pitchFamily="49" charset="0"/>
+                </a:rPr>
+                <a:t>Df</a:t>
+              </a:r>
+              <a:r>
+                <a:rPr lang="en-US" sz="1200" dirty="0">
+                  <a:latin typeface="Lucida Console" pitchFamily="49" charset="0"/>
+                </a:rPr>
+                <a:t> </a:t>
+              </a:r>
+              <a:r>
+                <a:rPr lang="en-US" sz="1200" dirty="0" err="1">
+                  <a:latin typeface="Lucida Console" pitchFamily="49" charset="0"/>
+                </a:rPr>
+                <a:t>Pr</a:t>
+              </a:r>
+              <a:r>
+                <a:rPr lang="en-US" sz="1200" dirty="0">
+                  <a:latin typeface="Lucida Console" pitchFamily="49" charset="0"/>
+                </a:rPr>
+                <a:t>(&gt;F)   </a:t>
+              </a:r>
+            </a:p>
+            <a:p>
+              <a:r>
+                <a:rPr lang="en-US" sz="1200" dirty="0">
+                  <a:latin typeface="Lucida Console" pitchFamily="49" charset="0"/>
+                </a:rPr>
+                <a:t>n   1     0.202     2.02      3     24 0.1376   </a:t>
+              </a:r>
+            </a:p>
+            <a:p>
+              <a:r>
+                <a:rPr lang="en-US" sz="1200" dirty="0">
+                  <a:latin typeface="Lucida Console" pitchFamily="49" charset="0"/>
+                </a:rPr>
+                <a:t>s   1     0.310     3.59      3     24 0.0284 * </a:t>
+              </a:r>
+            </a:p>
+            <a:p>
+              <a:r>
+                <a:rPr lang="en-US" sz="1200" dirty="0">
+                  <a:latin typeface="Lucida Console" pitchFamily="49" charset="0"/>
+                </a:rPr>
+                <a:t>ns  1     0.358     4.46      3     24 0.0126 * </a:t>
+              </a:r>
+            </a:p>
+            <a:p>
+              <a:r>
+                <a:rPr lang="en-US" sz="1200" dirty="0" err="1">
+                  <a:latin typeface="Lucida Console" pitchFamily="49" charset="0"/>
+                </a:rPr>
+                <a:t>na</a:t>
+              </a:r>
+              <a:r>
+                <a:rPr lang="en-US" sz="1200" dirty="0">
+                  <a:latin typeface="Lucida Console" pitchFamily="49" charset="0"/>
+                </a:rPr>
+                <a:t>  1     0.465     6.96      3     24 0.0016 **</a:t>
+              </a:r>
+            </a:p>
+            <a:p>
+              <a:r>
+                <a:rPr lang="en-US" sz="1200" dirty="0" err="1">
+                  <a:latin typeface="Lucida Console" pitchFamily="49" charset="0"/>
+                </a:rPr>
+                <a:t>ss</a:t>
+              </a:r>
+              <a:r>
+                <a:rPr lang="en-US" sz="1200" dirty="0">
+                  <a:latin typeface="Lucida Console" pitchFamily="49" charset="0"/>
+                </a:rPr>
+                <a:t>  1     0.089     0.78      3     24 0.5173   </a:t>
+              </a:r>
+            </a:p>
+            <a:p>
+              <a:r>
+                <a:rPr lang="en-US" sz="1200" dirty="0">
+                  <a:latin typeface="Lucida Console" pitchFamily="49" charset="0"/>
+                </a:rPr>
+                <a:t>---</a:t>
+              </a:r>
+            </a:p>
+            <a:p>
+              <a:r>
+                <a:rPr lang="en-US" sz="1200" dirty="0" err="1">
+                  <a:latin typeface="Lucida Console" pitchFamily="49" charset="0"/>
+                </a:rPr>
+                <a:t>Signif</a:t>
+              </a:r>
+              <a:r>
+                <a:rPr lang="en-US" sz="1200" dirty="0">
+                  <a:latin typeface="Lucida Console" pitchFamily="49" charset="0"/>
+                </a:rPr>
+                <a:t>. codes:  0 ‘***’ 0.001 ‘**’ 0.01 ‘*’ 0.05 ‘.’ 0.1 ‘ ’ 1</a:t>
+              </a:r>
+            </a:p>
+          </p:txBody>
+        </p:sp>
+        <p:sp>
+          <p:nvSpPr>
+            <p:cNvPr id="7" name="TextBox 6"/>
+            <p:cNvSpPr txBox="1"/>
+            <p:nvPr/>
+          </p:nvSpPr>
+          <p:spPr>
+            <a:xfrm>
+              <a:off x="6553200" y="1837851"/>
+              <a:ext cx="2133600" cy="1477328"/>
+            </a:xfrm>
+            <a:prstGeom prst="rect">
+              <a:avLst/>
+            </a:prstGeom>
+            <a:solidFill>
+              <a:srgbClr val="FFFF00"/>
+            </a:solidFill>
+          </p:spPr>
+          <p:txBody>
+            <a:bodyPr wrap="square" rtlCol="0">
+              <a:spAutoFit/>
+            </a:bodyPr>
+            <a:lstStyle/>
+            <a:p>
+              <a:r>
+                <a:rPr lang="en-US" sz="1600" dirty="0"/>
+                <a:t>Much better!</a:t>
+              </a:r>
+            </a:p>
+            <a:p>
+              <a:endParaRPr lang="en-US" sz="1600" dirty="0"/>
+            </a:p>
+            <a:p>
+              <a:r>
+                <a:rPr lang="en-US" sz="1600" dirty="0"/>
+                <a:t>Multivariate tests:</a:t>
+              </a:r>
+            </a:p>
+            <a:p>
+              <a:pPr marL="285750" indent="-285750">
+                <a:buFont typeface="Arial" pitchFamily="34" charset="0"/>
+                <a:buChar char="•"/>
+              </a:pPr>
+              <a:r>
+                <a:rPr lang="en-US" sz="1400" dirty="0"/>
+                <a:t>pool evidence for all </a:t>
+              </a:r>
+              <a:r>
+                <a:rPr lang="en-US" sz="1400" dirty="0" err="1"/>
+                <a:t>Ys</a:t>
+              </a:r>
+              <a:endParaRPr lang="en-US" sz="1400" dirty="0"/>
+            </a:p>
+            <a:p>
+              <a:pPr marL="285750" indent="-285750">
+                <a:buFont typeface="Arial" pitchFamily="34" charset="0"/>
+                <a:buChar char="•"/>
+              </a:pPr>
+              <a:r>
+                <a:rPr lang="en-US" sz="1400" dirty="0"/>
+                <a:t>take correlations of </a:t>
+              </a:r>
+              <a:r>
+                <a:rPr lang="en-US" sz="1400" dirty="0" err="1"/>
+                <a:t>Ys</a:t>
+              </a:r>
+              <a:r>
+                <a:rPr lang="en-US" sz="1400" dirty="0"/>
+                <a:t> into account</a:t>
+              </a:r>
+            </a:p>
+          </p:txBody>
+        </p:sp>
+      </p:grpSp>
+      <p:grpSp>
+        <p:nvGrpSpPr>
+          <p:cNvPr id="11" name="Group 10">
+            <a:extLst>
+              <a:ext uri="{FF2B5EF4-FFF2-40B4-BE49-F238E27FC236}">
+                <a16:creationId xmlns:a16="http://schemas.microsoft.com/office/drawing/2014/main" id="{FCEA8272-4468-4914-8AB7-C9D045A65581}"/>
+              </a:ext>
+            </a:extLst>
+          </p:cNvPr>
+          <p:cNvGrpSpPr/>
           <p:nvPr/>
-        </p:nvSpPr>
-        <p:spPr>
+        </p:nvGrpSpPr>
+        <p:grpSpPr>
           <a:xfrm>
-            <a:off x="7086600" y="5562600"/>
-            <a:ext cx="1650023" cy="584775"/>
+            <a:off x="527538" y="4753680"/>
+            <a:ext cx="8209085" cy="1754326"/>
+            <a:chOff x="527538" y="4753680"/>
+            <a:chExt cx="8209085" cy="1754326"/>
           </a:xfrm>
-          <a:prstGeom prst="rect">
-            <a:avLst/>
-          </a:prstGeom>
-          <a:solidFill>
-            <a:srgbClr val="FFFF00"/>
-          </a:solidFill>
-        </p:spPr>
-        <p:txBody>
-          <a:bodyPr wrap="square" rtlCol="0">
-            <a:spAutoFit/>
-          </a:bodyPr>
-          <a:lstStyle/>
-          <a:p>
-            <a:r>
-              <a:rPr lang="en-US" sz="1600" dirty="0"/>
-              <a:t>Strongly reject H</a:t>
-            </a:r>
-            <a:r>
-              <a:rPr lang="en-US" sz="1600" baseline="-25000" dirty="0"/>
-              <a:t>0</a:t>
-            </a:r>
-            <a:r>
-              <a:rPr lang="en-US" sz="1600" dirty="0"/>
-              <a:t> by all criteria</a:t>
-            </a:r>
-          </a:p>
-        </p:txBody>
-      </p:sp>
+        </p:grpSpPr>
+        <p:sp>
+          <p:nvSpPr>
+            <p:cNvPr id="5" name="TextBox 4"/>
+            <p:cNvSpPr txBox="1"/>
+            <p:nvPr/>
+          </p:nvSpPr>
+          <p:spPr>
+            <a:xfrm>
+              <a:off x="527538" y="4753680"/>
+              <a:ext cx="7772400" cy="1754326"/>
+            </a:xfrm>
+            <a:prstGeom prst="rect">
+              <a:avLst/>
+            </a:prstGeom>
+            <a:solidFill>
+              <a:srgbClr val="FFFF00">
+                <a:alpha val="10000"/>
+              </a:srgbClr>
+            </a:solidFill>
+          </p:spPr>
+          <p:txBody>
+            <a:bodyPr wrap="square" rtlCol="0">
+              <a:spAutoFit/>
+            </a:bodyPr>
+            <a:lstStyle/>
+            <a:p>
+              <a:r>
+                <a:rPr lang="en-US" sz="1200" dirty="0">
+                  <a:latin typeface="Lucida Console" pitchFamily="49" charset="0"/>
+                </a:rPr>
+                <a:t>&gt; print(</a:t>
+              </a:r>
+              <a:r>
+                <a:rPr lang="en-US" sz="1200" dirty="0" err="1">
+                  <a:latin typeface="Lucida Console" pitchFamily="49" charset="0"/>
+                </a:rPr>
+                <a:t>linearHypothesis</a:t>
+              </a:r>
+              <a:r>
+                <a:rPr lang="en-US" sz="1200" dirty="0">
+                  <a:latin typeface="Lucida Console" pitchFamily="49" charset="0"/>
+                </a:rPr>
+                <a:t>(</a:t>
+              </a:r>
+              <a:r>
+                <a:rPr lang="en-US" sz="1200" dirty="0" err="1">
+                  <a:latin typeface="Lucida Console" pitchFamily="49" charset="0"/>
+                </a:rPr>
+                <a:t>rohwer.mlm</a:t>
+              </a:r>
+              <a:r>
+                <a:rPr lang="en-US" sz="1200" dirty="0">
+                  <a:latin typeface="Lucida Console" pitchFamily="49" charset="0"/>
+                </a:rPr>
+                <a:t>, </a:t>
+              </a:r>
+            </a:p>
+            <a:p>
+              <a:r>
+                <a:rPr lang="en-US" sz="1200" dirty="0">
+                  <a:latin typeface="Lucida Console" pitchFamily="49" charset="0"/>
+                </a:rPr>
+                <a:t>+                        c("n", "s", "ns", "</a:t>
+              </a:r>
+              <a:r>
+                <a:rPr lang="en-US" sz="1200" dirty="0" err="1">
+                  <a:latin typeface="Lucida Console" pitchFamily="49" charset="0"/>
+                </a:rPr>
+                <a:t>na</a:t>
+              </a:r>
+              <a:r>
+                <a:rPr lang="en-US" sz="1200" dirty="0">
+                  <a:latin typeface="Lucida Console" pitchFamily="49" charset="0"/>
+                </a:rPr>
+                <a:t>", "</a:t>
+              </a:r>
+              <a:r>
+                <a:rPr lang="en-US" sz="1200" dirty="0" err="1">
+                  <a:latin typeface="Lucida Console" pitchFamily="49" charset="0"/>
+                </a:rPr>
+                <a:t>ss</a:t>
+              </a:r>
+              <a:r>
+                <a:rPr lang="en-US" sz="1200" dirty="0">
+                  <a:latin typeface="Lucida Console" pitchFamily="49" charset="0"/>
+                </a:rPr>
+                <a:t>")), SSP=FALSE)</a:t>
+              </a:r>
+            </a:p>
+            <a:p>
+              <a:endParaRPr lang="en-US" sz="1200" dirty="0">
+                <a:latin typeface="Lucida Console" pitchFamily="49" charset="0"/>
+              </a:endParaRPr>
+            </a:p>
+            <a:p>
+              <a:r>
+                <a:rPr lang="en-US" sz="1200" dirty="0">
+                  <a:latin typeface="Lucida Console" pitchFamily="49" charset="0"/>
+                </a:rPr>
+                <a:t>Multivariate Tests: </a:t>
+              </a:r>
+            </a:p>
+            <a:p>
+              <a:r>
+                <a:rPr lang="en-US" sz="1200" dirty="0">
+                  <a:latin typeface="Lucida Console" pitchFamily="49" charset="0"/>
+                </a:rPr>
+                <a:t>                 </a:t>
+              </a:r>
+              <a:r>
+                <a:rPr lang="en-US" sz="1200" dirty="0" err="1">
+                  <a:latin typeface="Lucida Console" pitchFamily="49" charset="0"/>
+                </a:rPr>
+                <a:t>Df</a:t>
+              </a:r>
+              <a:r>
+                <a:rPr lang="en-US" sz="1200" dirty="0">
+                  <a:latin typeface="Lucida Console" pitchFamily="49" charset="0"/>
+                </a:rPr>
+                <a:t> test stat </a:t>
+              </a:r>
+              <a:r>
+                <a:rPr lang="en-US" sz="1200" dirty="0" err="1">
+                  <a:latin typeface="Lucida Console" pitchFamily="49" charset="0"/>
+                </a:rPr>
+                <a:t>approx</a:t>
+              </a:r>
+              <a:r>
+                <a:rPr lang="en-US" sz="1200" dirty="0">
+                  <a:latin typeface="Lucida Console" pitchFamily="49" charset="0"/>
+                </a:rPr>
+                <a:t> F </a:t>
+              </a:r>
+              <a:r>
+                <a:rPr lang="en-US" sz="1200" dirty="0" err="1">
+                  <a:latin typeface="Lucida Console" pitchFamily="49" charset="0"/>
+                </a:rPr>
+                <a:t>num</a:t>
+              </a:r>
+              <a:r>
+                <a:rPr lang="en-US" sz="1200" dirty="0">
+                  <a:latin typeface="Lucida Console" pitchFamily="49" charset="0"/>
+                </a:rPr>
+                <a:t> </a:t>
+              </a:r>
+              <a:r>
+                <a:rPr lang="en-US" sz="1200" dirty="0" err="1">
+                  <a:latin typeface="Lucida Console" pitchFamily="49" charset="0"/>
+                </a:rPr>
+                <a:t>Df</a:t>
+              </a:r>
+              <a:r>
+                <a:rPr lang="en-US" sz="1200" dirty="0">
+                  <a:latin typeface="Lucida Console" pitchFamily="49" charset="0"/>
+                </a:rPr>
+                <a:t> den </a:t>
+              </a:r>
+              <a:r>
+                <a:rPr lang="en-US" sz="1200" dirty="0" err="1">
+                  <a:latin typeface="Lucida Console" pitchFamily="49" charset="0"/>
+                </a:rPr>
+                <a:t>Df</a:t>
+              </a:r>
+              <a:r>
+                <a:rPr lang="en-US" sz="1200" dirty="0">
+                  <a:latin typeface="Lucida Console" pitchFamily="49" charset="0"/>
+                </a:rPr>
+                <a:t>   </a:t>
+              </a:r>
+              <a:r>
+                <a:rPr lang="en-US" sz="1200" dirty="0" err="1">
+                  <a:latin typeface="Lucida Console" pitchFamily="49" charset="0"/>
+                </a:rPr>
+                <a:t>Pr</a:t>
+              </a:r>
+              <a:r>
+                <a:rPr lang="en-US" sz="1200" dirty="0">
+                  <a:latin typeface="Lucida Console" pitchFamily="49" charset="0"/>
+                </a:rPr>
+                <a:t>(&gt;F)    </a:t>
+              </a:r>
+            </a:p>
+            <a:p>
+              <a:r>
+                <a:rPr lang="en-US" sz="1200" dirty="0" err="1">
+                  <a:latin typeface="Lucida Console" pitchFamily="49" charset="0"/>
+                </a:rPr>
+                <a:t>Pillai</a:t>
+              </a:r>
+              <a:r>
+                <a:rPr lang="en-US" sz="1200" dirty="0">
+                  <a:latin typeface="Lucida Console" pitchFamily="49" charset="0"/>
+                </a:rPr>
+                <a:t>            5    1.0386    2.753     15  78.00 0.001912 ** </a:t>
+              </a:r>
+            </a:p>
+            <a:p>
+              <a:r>
+                <a:rPr lang="en-US" sz="1200" dirty="0" err="1">
+                  <a:latin typeface="Lucida Console" pitchFamily="49" charset="0"/>
+                </a:rPr>
+                <a:t>Wilks</a:t>
+              </a:r>
+              <a:r>
+                <a:rPr lang="en-US" sz="1200" dirty="0">
+                  <a:latin typeface="Lucida Console" pitchFamily="49" charset="0"/>
+                </a:rPr>
+                <a:t>             5    0.2431    2.974     15  66.65 0.001154 ** </a:t>
+              </a:r>
+            </a:p>
+            <a:p>
+              <a:r>
+                <a:rPr lang="en-US" sz="1200" dirty="0" err="1">
+                  <a:latin typeface="Lucida Console" pitchFamily="49" charset="0"/>
+                </a:rPr>
+                <a:t>Hotelling-Lawley</a:t>
+              </a:r>
+              <a:r>
+                <a:rPr lang="en-US" sz="1200" dirty="0">
+                  <a:latin typeface="Lucida Console" pitchFamily="49" charset="0"/>
+                </a:rPr>
+                <a:t>  5    2.0615    3.115     15  68.00 0.000697 ***</a:t>
+              </a:r>
+            </a:p>
+            <a:p>
+              <a:r>
+                <a:rPr lang="en-US" sz="1200" dirty="0">
+                  <a:latin typeface="Lucida Console" pitchFamily="49" charset="0"/>
+                </a:rPr>
+                <a:t>Roy               5    1.4654    7.620      5  26.00 0.000160 ***</a:t>
+              </a:r>
+            </a:p>
+          </p:txBody>
+        </p:sp>
+        <p:sp>
+          <p:nvSpPr>
+            <p:cNvPr id="8" name="TextBox 7"/>
+            <p:cNvSpPr txBox="1"/>
+            <p:nvPr/>
+          </p:nvSpPr>
+          <p:spPr>
+            <a:xfrm>
+              <a:off x="7086600" y="5562600"/>
+              <a:ext cx="1650023" cy="584775"/>
+            </a:xfrm>
+            <a:prstGeom prst="rect">
+              <a:avLst/>
+            </a:prstGeom>
+            <a:solidFill>
+              <a:srgbClr val="FFFF00"/>
+            </a:solidFill>
+          </p:spPr>
+          <p:txBody>
+            <a:bodyPr wrap="square" rtlCol="0">
+              <a:spAutoFit/>
+            </a:bodyPr>
+            <a:lstStyle/>
+            <a:p>
+              <a:r>
+                <a:rPr lang="en-US" sz="1600" dirty="0"/>
+                <a:t>Strongly reject H</a:t>
+              </a:r>
+              <a:r>
+                <a:rPr lang="en-US" sz="1600" baseline="-25000" dirty="0"/>
+                <a:t>0</a:t>
+              </a:r>
+              <a:r>
+                <a:rPr lang="en-US" sz="1600" dirty="0"/>
+                <a:t> by all criteria</a:t>
+              </a:r>
+            </a:p>
+          </p:txBody>
+        </p:sp>
+      </p:grpSp>
     </p:spTree>
     <p:extLst>
       <p:ext uri="{BB962C8B-B14F-4D97-AF65-F5344CB8AC3E}">
@@ -10019,6 +10305,111 @@
   <p:clrMapOvr>
     <a:masterClrMapping/>
   </p:clrMapOvr>
+  <p:timing>
+    <p:tnLst>
+      <p:par>
+        <p:cTn id="1" dur="indefinite" restart="never" nodeType="tmRoot">
+          <p:childTnLst>
+            <p:seq concurrent="1" nextAc="seek">
+              <p:cTn id="2" dur="indefinite" nodeType="mainSeq">
+                <p:childTnLst>
+                  <p:par>
+                    <p:cTn id="3" fill="hold">
+                      <p:stCondLst>
+                        <p:cond delay="indefinite"/>
+                      </p:stCondLst>
+                      <p:childTnLst>
+                        <p:par>
+                          <p:cTn id="4" fill="hold">
+                            <p:stCondLst>
+                              <p:cond delay="0"/>
+                            </p:stCondLst>
+                            <p:childTnLst>
+                              <p:par>
+                                <p:cTn id="5" presetID="1" presetClass="entr" presetSubtype="0" fill="hold" grpId="0" nodeType="clickEffect">
+                                  <p:stCondLst>
+                                    <p:cond delay="0"/>
+                                  </p:stCondLst>
+                                  <p:childTnLst>
+                                    <p:set>
+                                      <p:cBhvr>
+                                        <p:cTn id="6" dur="1" fill="hold">
+                                          <p:stCondLst>
+                                            <p:cond delay="0"/>
+                                          </p:stCondLst>
+                                        </p:cTn>
+                                        <p:tgtEl>
+                                          <p:spTgt spid="6"/>
+                                        </p:tgtEl>
+                                        <p:attrNameLst>
+                                          <p:attrName>style.visibility</p:attrName>
+                                        </p:attrNameLst>
+                                      </p:cBhvr>
+                                      <p:to>
+                                        <p:strVal val="visible"/>
+                                      </p:to>
+                                    </p:set>
+                                  </p:childTnLst>
+                                </p:cTn>
+                              </p:par>
+                              <p:par>
+                                <p:cTn id="7" presetID="1" presetClass="entr" presetSubtype="0" fill="hold" nodeType="withEffect">
+                                  <p:stCondLst>
+                                    <p:cond delay="1500"/>
+                                  </p:stCondLst>
+                                  <p:childTnLst>
+                                    <p:set>
+                                      <p:cBhvr>
+                                        <p:cTn id="8" dur="1" fill="hold">
+                                          <p:stCondLst>
+                                            <p:cond delay="0"/>
+                                          </p:stCondLst>
+                                        </p:cTn>
+                                        <p:tgtEl>
+                                          <p:spTgt spid="11"/>
+                                        </p:tgtEl>
+                                        <p:attrNameLst>
+                                          <p:attrName>style.visibility</p:attrName>
+                                        </p:attrNameLst>
+                                      </p:cBhvr>
+                                      <p:to>
+                                        <p:strVal val="visible"/>
+                                      </p:to>
+                                    </p:set>
+                                  </p:childTnLst>
+                                </p:cTn>
+                              </p:par>
+                            </p:childTnLst>
+                          </p:cTn>
+                        </p:par>
+                      </p:childTnLst>
+                    </p:cTn>
+                  </p:par>
+                </p:childTnLst>
+              </p:cTn>
+              <p:prevCondLst>
+                <p:cond evt="onPrev" delay="0">
+                  <p:tgtEl>
+                    <p:sldTgt/>
+                  </p:tgtEl>
+                </p:cond>
+              </p:prevCondLst>
+              <p:nextCondLst>
+                <p:cond evt="onNext" delay="0">
+                  <p:tgtEl>
+                    <p:sldTgt/>
+                  </p:tgtEl>
+                </p:cond>
+              </p:nextCondLst>
+            </p:seq>
+          </p:childTnLst>
+        </p:cTn>
+      </p:par>
+    </p:tnLst>
+    <p:bldLst>
+      <p:bldP spid="6" grpId="0" animBg="1"/>
+    </p:bldLst>
+  </p:timing>
 </p:sld>
 </file>
 
@@ -10606,7 +10997,7 @@
         <p:spPr>
           <a:xfrm>
             <a:off x="457200" y="1658800"/>
-            <a:ext cx="8229600" cy="369332"/>
+            <a:ext cx="8229600" cy="646331"/>
           </a:xfrm>
           <a:prstGeom prst="rect">
             <a:avLst/>
@@ -10641,7 +11032,13 @@
             </a:r>
             <a:r>
               <a:rPr lang="en-US" dirty="0"/>
-              <a:t>, col=cols, fill=TRUE, </a:t>
+              <a:t>, </a:t>
+            </a:r>
+          </a:p>
+          <a:p>
+            <a:r>
+              <a:rPr lang="en-US" dirty="0"/>
+              <a:t>          col=cols, fill=TRUE, </a:t>
             </a:r>
             <a:r>
               <a:rPr lang="en-US" dirty="0" err="1"/>
@@ -10676,7 +11073,7 @@
         </p:blipFill>
         <p:spPr>
           <a:xfrm>
-            <a:off x="609600" y="2514600"/>
+            <a:off x="609600" y="2750902"/>
             <a:ext cx="3657600" cy="3657600"/>
           </a:xfrm>
           <a:prstGeom prst="rect">
@@ -10693,7 +11090,7 @@
         <p:spPr>
           <a:xfrm>
             <a:off x="457200" y="1143000"/>
-            <a:ext cx="8229600" cy="381000"/>
+            <a:ext cx="8229600" cy="461665"/>
           </a:xfrm>
           <a:prstGeom prst="rect">
             <a:avLst/>
@@ -10707,7 +11104,7 @@
           <a:lstStyle/>
           <a:p>
             <a:r>
-              <a:rPr lang="en-US" dirty="0"/>
+              <a:rPr lang="en-US" sz="2400" dirty="0"/>
               <a:t>View all pairwise HE plots</a:t>
             </a:r>
           </a:p>
@@ -10721,7 +11118,7 @@
         </p:nvSpPr>
         <p:spPr>
           <a:xfrm>
-            <a:off x="4648200" y="2514600"/>
+            <a:off x="4648200" y="2750902"/>
             <a:ext cx="4038600" cy="2031325"/>
           </a:xfrm>
           <a:prstGeom prst="rect">
@@ -11266,6 +11663,92 @@
           </a:p>
         </p:txBody>
       </p:sp>
+      <p:sp>
+        <p:nvSpPr>
+          <p:cNvPr id="8" name="Rectangle 7">
+            <a:extLst>
+              <a:ext uri="{FF2B5EF4-FFF2-40B4-BE49-F238E27FC236}">
+                <a16:creationId xmlns:a16="http://schemas.microsoft.com/office/drawing/2014/main" id="{DB9A3BD0-BC0A-4581-BED4-C58B58C8EF42}"/>
+              </a:ext>
+            </a:extLst>
+          </p:cNvPr>
+          <p:cNvSpPr/>
+          <p:nvPr/>
+        </p:nvSpPr>
+        <p:spPr>
+          <a:xfrm>
+            <a:off x="5638800" y="4871662"/>
+            <a:ext cx="365805" cy="369332"/>
+          </a:xfrm>
+          <a:prstGeom prst="rect">
+            <a:avLst/>
+          </a:prstGeom>
+        </p:spPr>
+        <p:txBody>
+          <a:bodyPr wrap="none">
+            <a:spAutoFit/>
+          </a:bodyPr>
+          <a:lstStyle/>
+          <a:p>
+            <a:pPr algn="ctr"/>
+            <a:r>
+              <a:rPr lang="en-US" dirty="0">
+                <a:solidFill>
+                  <a:srgbClr val="00B050"/>
+                </a:solidFill>
+                <a:sym typeface="Wingdings"/>
+              </a:rPr>
+              <a:t></a:t>
+            </a:r>
+            <a:endParaRPr lang="en-US" dirty="0"/>
+          </a:p>
+        </p:txBody>
+      </p:sp>
+      <p:sp>
+        <p:nvSpPr>
+          <p:cNvPr id="9" name="Rectangle 8">
+            <a:extLst>
+              <a:ext uri="{FF2B5EF4-FFF2-40B4-BE49-F238E27FC236}">
+                <a16:creationId xmlns:a16="http://schemas.microsoft.com/office/drawing/2014/main" id="{0EA650E1-58E2-4279-B751-10194416435A}"/>
+              </a:ext>
+            </a:extLst>
+          </p:cNvPr>
+          <p:cNvSpPr/>
+          <p:nvPr/>
+        </p:nvSpPr>
+        <p:spPr>
+          <a:xfrm>
+            <a:off x="5656432" y="5123765"/>
+            <a:ext cx="330540" cy="369332"/>
+          </a:xfrm>
+          <a:prstGeom prst="rect">
+            <a:avLst/>
+          </a:prstGeom>
+        </p:spPr>
+        <p:txBody>
+          <a:bodyPr wrap="none">
+            <a:spAutoFit/>
+          </a:bodyPr>
+          <a:lstStyle/>
+          <a:p>
+            <a:pPr lvl="0" algn="ctr"/>
+            <a:r>
+              <a:rPr lang="en-US" dirty="0">
+                <a:solidFill>
+                  <a:srgbClr val="FF0000"/>
+                </a:solidFill>
+                <a:sym typeface="Wingdings"/>
+              </a:rPr>
+              <a:t></a:t>
+            </a:r>
+            <a:endParaRPr lang="en-US" dirty="0">
+              <a:solidFill>
+                <a:srgbClr val="FF0000"/>
+              </a:solidFill>
+            </a:endParaRPr>
+          </a:p>
+        </p:txBody>
+      </p:sp>
     </p:spTree>
     <p:extLst>
       <p:ext uri="{BB962C8B-B14F-4D97-AF65-F5344CB8AC3E}">
@@ -12224,7 +12707,22 @@
               <a:rPr lang="en-US" sz="1400" dirty="0">
                 <a:latin typeface="Lucida Console" pitchFamily="49" charset="0"/>
               </a:rPr>
-              <a:t>(SAT, PPVT, Raven) ~ SES + n + s + ns + </a:t>
+              <a:t>(SAT, PPVT, Raven) ~ </a:t>
+            </a:r>
+            <a:r>
+              <a:rPr lang="en-US" sz="1400" b="1" dirty="0">
+                <a:solidFill>
+                  <a:srgbClr val="FF0000"/>
+                </a:solidFill>
+                <a:latin typeface="Lucida Console" pitchFamily="49" charset="0"/>
+              </a:rPr>
+              <a:t>SES</a:t>
+            </a:r>
+            <a:r>
+              <a:rPr lang="en-US" sz="1400" dirty="0">
+                <a:latin typeface="Lucida Console" pitchFamily="49" charset="0"/>
+              </a:rPr>
+              <a:t> + n + s + ns + </a:t>
             </a:r>
             <a:r>
               <a:rPr lang="en-US" sz="1400" dirty="0" err="1">
@@ -19881,7 +20379,7 @@
               <a:rPr lang="en-US" smtClean="0"/>
               <a:t>5</a:t>
             </a:fld>
-            <a:endParaRPr lang="en-US"/>
+            <a:endParaRPr lang="en-US" dirty="0"/>
           </a:p>
         </p:txBody>
       </p:sp>
@@ -20809,6 +21307,330 @@
   <p:clrMapOvr>
     <a:masterClrMapping/>
   </p:clrMapOvr>
+  <p:timing>
+    <p:tnLst>
+      <p:par>
+        <p:cTn id="1" dur="indefinite" restart="never" nodeType="tmRoot">
+          <p:childTnLst>
+            <p:seq concurrent="1" nextAc="seek">
+              <p:cTn id="2" dur="indefinite" nodeType="mainSeq">
+                <p:childTnLst>
+                  <p:par>
+                    <p:cTn id="3" fill="hold">
+                      <p:stCondLst>
+                        <p:cond delay="indefinite"/>
+                      </p:stCondLst>
+                      <p:childTnLst>
+                        <p:par>
+                          <p:cTn id="4" fill="hold">
+                            <p:stCondLst>
+                              <p:cond delay="0"/>
+                            </p:stCondLst>
+                            <p:childTnLst>
+                              <p:par>
+                                <p:cTn id="5" presetID="1" presetClass="entr" presetSubtype="0" fill="hold" grpId="0" nodeType="clickEffect">
+                                  <p:stCondLst>
+                                    <p:cond delay="0"/>
+                                  </p:stCondLst>
+                                  <p:childTnLst>
+                                    <p:set>
+                                      <p:cBhvr>
+                                        <p:cTn id="6" dur="1" fill="hold">
+                                          <p:stCondLst>
+                                            <p:cond delay="0"/>
+                                          </p:stCondLst>
+                                        </p:cTn>
+                                        <p:tgtEl>
+                                          <p:spTgt spid="6"/>
+                                        </p:tgtEl>
+                                        <p:attrNameLst>
+                                          <p:attrName>style.visibility</p:attrName>
+                                        </p:attrNameLst>
+                                      </p:cBhvr>
+                                      <p:to>
+                                        <p:strVal val="visible"/>
+                                      </p:to>
+                                    </p:set>
+                                  </p:childTnLst>
+                                </p:cTn>
+                              </p:par>
+                              <p:par>
+                                <p:cTn id="7" presetID="1" presetClass="entr" presetSubtype="0" fill="hold" nodeType="withEffect">
+                                  <p:stCondLst>
+                                    <p:cond delay="0"/>
+                                  </p:stCondLst>
+                                  <p:childTnLst>
+                                    <p:set>
+                                      <p:cBhvr>
+                                        <p:cTn id="8" dur="1" fill="hold">
+                                          <p:stCondLst>
+                                            <p:cond delay="0"/>
+                                          </p:stCondLst>
+                                        </p:cTn>
+                                        <p:tgtEl>
+                                          <p:spTgt spid="3"/>
+                                        </p:tgtEl>
+                                        <p:attrNameLst>
+                                          <p:attrName>style.visibility</p:attrName>
+                                        </p:attrNameLst>
+                                      </p:cBhvr>
+                                      <p:to>
+                                        <p:strVal val="visible"/>
+                                      </p:to>
+                                    </p:set>
+                                  </p:childTnLst>
+                                </p:cTn>
+                              </p:par>
+                            </p:childTnLst>
+                          </p:cTn>
+                        </p:par>
+                      </p:childTnLst>
+                    </p:cTn>
+                  </p:par>
+                  <p:par>
+                    <p:cTn id="9" fill="hold">
+                      <p:stCondLst>
+                        <p:cond delay="indefinite"/>
+                      </p:stCondLst>
+                      <p:childTnLst>
+                        <p:par>
+                          <p:cTn id="10" fill="hold">
+                            <p:stCondLst>
+                              <p:cond delay="0"/>
+                            </p:stCondLst>
+                            <p:childTnLst>
+                              <p:par>
+                                <p:cTn id="11" presetID="1" presetClass="entr" presetSubtype="0" fill="hold" grpId="0" nodeType="clickEffect">
+                                  <p:stCondLst>
+                                    <p:cond delay="0"/>
+                                  </p:stCondLst>
+                                  <p:childTnLst>
+                                    <p:set>
+                                      <p:cBhvr>
+                                        <p:cTn id="12" dur="1" fill="hold">
+                                          <p:stCondLst>
+                                            <p:cond delay="0"/>
+                                          </p:stCondLst>
+                                        </p:cTn>
+                                        <p:tgtEl>
+                                          <p:spTgt spid="7"/>
+                                        </p:tgtEl>
+                                        <p:attrNameLst>
+                                          <p:attrName>style.visibility</p:attrName>
+                                        </p:attrNameLst>
+                                      </p:cBhvr>
+                                      <p:to>
+                                        <p:strVal val="visible"/>
+                                      </p:to>
+                                    </p:set>
+                                  </p:childTnLst>
+                                </p:cTn>
+                              </p:par>
+                              <p:par>
+                                <p:cTn id="13" presetID="1" presetClass="entr" presetSubtype="0" fill="hold" nodeType="withEffect">
+                                  <p:stCondLst>
+                                    <p:cond delay="0"/>
+                                  </p:stCondLst>
+                                  <p:childTnLst>
+                                    <p:set>
+                                      <p:cBhvr>
+                                        <p:cTn id="14" dur="1" fill="hold">
+                                          <p:stCondLst>
+                                            <p:cond delay="0"/>
+                                          </p:stCondLst>
+                                        </p:cTn>
+                                        <p:tgtEl>
+                                          <p:spTgt spid="4"/>
+                                        </p:tgtEl>
+                                        <p:attrNameLst>
+                                          <p:attrName>style.visibility</p:attrName>
+                                        </p:attrNameLst>
+                                      </p:cBhvr>
+                                      <p:to>
+                                        <p:strVal val="visible"/>
+                                      </p:to>
+                                    </p:set>
+                                  </p:childTnLst>
+                                </p:cTn>
+                              </p:par>
+                              <p:par>
+                                <p:cTn id="15" presetID="1" presetClass="entr" presetSubtype="0" fill="hold" nodeType="withEffect">
+                                  <p:stCondLst>
+                                    <p:cond delay="0"/>
+                                  </p:stCondLst>
+                                  <p:childTnLst>
+                                    <p:set>
+                                      <p:cBhvr>
+                                        <p:cTn id="16" dur="1" fill="hold">
+                                          <p:stCondLst>
+                                            <p:cond delay="0"/>
+                                          </p:stCondLst>
+                                        </p:cTn>
+                                        <p:tgtEl>
+                                          <p:spTgt spid="9"/>
+                                        </p:tgtEl>
+                                        <p:attrNameLst>
+                                          <p:attrName>style.visibility</p:attrName>
+                                        </p:attrNameLst>
+                                      </p:cBhvr>
+                                      <p:to>
+                                        <p:strVal val="visible"/>
+                                      </p:to>
+                                    </p:set>
+                                  </p:childTnLst>
+                                </p:cTn>
+                              </p:par>
+                              <p:par>
+                                <p:cTn id="17" presetID="1" presetClass="entr" presetSubtype="0" fill="hold" nodeType="withEffect">
+                                  <p:stCondLst>
+                                    <p:cond delay="0"/>
+                                  </p:stCondLst>
+                                  <p:childTnLst>
+                                    <p:set>
+                                      <p:cBhvr>
+                                        <p:cTn id="18" dur="1" fill="hold">
+                                          <p:stCondLst>
+                                            <p:cond delay="0"/>
+                                          </p:stCondLst>
+                                        </p:cTn>
+                                        <p:tgtEl>
+                                          <p:spTgt spid="11"/>
+                                        </p:tgtEl>
+                                        <p:attrNameLst>
+                                          <p:attrName>style.visibility</p:attrName>
+                                        </p:attrNameLst>
+                                      </p:cBhvr>
+                                      <p:to>
+                                        <p:strVal val="visible"/>
+                                      </p:to>
+                                    </p:set>
+                                  </p:childTnLst>
+                                </p:cTn>
+                              </p:par>
+                            </p:childTnLst>
+                          </p:cTn>
+                        </p:par>
+                      </p:childTnLst>
+                    </p:cTn>
+                  </p:par>
+                  <p:par>
+                    <p:cTn id="19" fill="hold">
+                      <p:stCondLst>
+                        <p:cond delay="indefinite"/>
+                      </p:stCondLst>
+                      <p:childTnLst>
+                        <p:par>
+                          <p:cTn id="20" fill="hold">
+                            <p:stCondLst>
+                              <p:cond delay="0"/>
+                            </p:stCondLst>
+                            <p:childTnLst>
+                              <p:par>
+                                <p:cTn id="21" presetID="2" presetClass="entr" presetSubtype="4" fill="hold" grpId="0" nodeType="clickEffect">
+                                  <p:stCondLst>
+                                    <p:cond delay="0"/>
+                                  </p:stCondLst>
+                                  <p:childTnLst>
+                                    <p:set>
+                                      <p:cBhvr>
+                                        <p:cTn id="22" dur="1" fill="hold">
+                                          <p:stCondLst>
+                                            <p:cond delay="0"/>
+                                          </p:stCondLst>
+                                        </p:cTn>
+                                        <p:tgtEl>
+                                          <p:spTgt spid="8"/>
+                                        </p:tgtEl>
+                                        <p:attrNameLst>
+                                          <p:attrName>style.visibility</p:attrName>
+                                        </p:attrNameLst>
+                                      </p:cBhvr>
+                                      <p:to>
+                                        <p:strVal val="visible"/>
+                                      </p:to>
+                                    </p:set>
+                                    <p:anim calcmode="lin" valueType="num">
+                                      <p:cBhvr additive="base">
+                                        <p:cTn id="23" dur="500" fill="hold"/>
+                                        <p:tgtEl>
+                                          <p:spTgt spid="8"/>
+                                        </p:tgtEl>
+                                        <p:attrNameLst>
+                                          <p:attrName>ppt_x</p:attrName>
+                                        </p:attrNameLst>
+                                      </p:cBhvr>
+                                      <p:tavLst>
+                                        <p:tav tm="0">
+                                          <p:val>
+                                            <p:strVal val="#ppt_x"/>
+                                          </p:val>
+                                        </p:tav>
+                                        <p:tav tm="100000">
+                                          <p:val>
+                                            <p:strVal val="#ppt_x"/>
+                                          </p:val>
+                                        </p:tav>
+                                      </p:tavLst>
+                                    </p:anim>
+                                    <p:anim calcmode="lin" valueType="num">
+                                      <p:cBhvr additive="base">
+                                        <p:cTn id="24" dur="500" fill="hold"/>
+                                        <p:tgtEl>
+                                          <p:spTgt spid="8"/>
+                                        </p:tgtEl>
+                                        <p:attrNameLst>
+                                          <p:attrName>ppt_y</p:attrName>
+                                        </p:attrNameLst>
+                                      </p:cBhvr>
+                                      <p:tavLst>
+                                        <p:tav tm="0">
+                                          <p:val>
+                                            <p:strVal val="1+#ppt_h/2"/>
+                                          </p:val>
+                                        </p:tav>
+                                        <p:tav tm="100000">
+                                          <p:val>
+                                            <p:strVal val="#ppt_y"/>
+                                          </p:val>
+                                        </p:tav>
+                                      </p:tavLst>
+                                    </p:anim>
+                                  </p:childTnLst>
+                                </p:cTn>
+                              </p:par>
+                            </p:childTnLst>
+                          </p:cTn>
+                        </p:par>
+                      </p:childTnLst>
+                    </p:cTn>
+                  </p:par>
+                </p:childTnLst>
+              </p:cTn>
+              <p:prevCondLst>
+                <p:cond evt="onPrev" delay="0">
+                  <p:tgtEl>
+                    <p:sldTgt/>
+                  </p:tgtEl>
+                </p:cond>
+              </p:prevCondLst>
+              <p:nextCondLst>
+                <p:cond evt="onNext" delay="0">
+                  <p:tgtEl>
+                    <p:sldTgt/>
+                  </p:tgtEl>
+                </p:cond>
+              </p:nextCondLst>
+            </p:seq>
+          </p:childTnLst>
+        </p:cTn>
+      </p:par>
+    </p:tnLst>
+    <p:bldLst>
+      <p:bldP spid="6" grpId="0" animBg="1"/>
+      <p:bldP spid="7" grpId="0" animBg="1"/>
+      <p:bldP spid="8" grpId="0"/>
+    </p:bldLst>
+  </p:timing>
 </p:sld>
 </file>
 
@@ -21351,6 +22173,258 @@
   <p:clrMapOvr>
     <a:masterClrMapping/>
   </p:clrMapOvr>
+  <p:timing>
+    <p:tnLst>
+      <p:par>
+        <p:cTn id="1" dur="indefinite" restart="never" nodeType="tmRoot">
+          <p:childTnLst>
+            <p:seq concurrent="1" nextAc="seek">
+              <p:cTn id="2" dur="indefinite" nodeType="mainSeq">
+                <p:childTnLst>
+                  <p:par>
+                    <p:cTn id="3" fill="hold">
+                      <p:stCondLst>
+                        <p:cond delay="indefinite"/>
+                      </p:stCondLst>
+                      <p:childTnLst>
+                        <p:par>
+                          <p:cTn id="4" fill="hold">
+                            <p:stCondLst>
+                              <p:cond delay="0"/>
+                            </p:stCondLst>
+                            <p:childTnLst>
+                              <p:par>
+                                <p:cTn id="5" presetID="1" presetClass="entr" presetSubtype="0" fill="hold" nodeType="clickEffect">
+                                  <p:stCondLst>
+                                    <p:cond delay="0"/>
+                                  </p:stCondLst>
+                                  <p:childTnLst>
+                                    <p:set>
+                                      <p:cBhvr>
+                                        <p:cTn id="6" dur="1" fill="hold">
+                                          <p:stCondLst>
+                                            <p:cond delay="0"/>
+                                          </p:stCondLst>
+                                        </p:cTn>
+                                        <p:tgtEl>
+                                          <p:spTgt spid="3">
+                                            <p:txEl>
+                                              <p:pRg st="0" end="0"/>
+                                            </p:txEl>
+                                          </p:spTgt>
+                                        </p:tgtEl>
+                                        <p:attrNameLst>
+                                          <p:attrName>style.visibility</p:attrName>
+                                        </p:attrNameLst>
+                                      </p:cBhvr>
+                                      <p:to>
+                                        <p:strVal val="visible"/>
+                                      </p:to>
+                                    </p:set>
+                                  </p:childTnLst>
+                                </p:cTn>
+                              </p:par>
+                              <p:par>
+                                <p:cTn id="7" presetID="1" presetClass="entr" presetSubtype="0" fill="hold" nodeType="withEffect">
+                                  <p:stCondLst>
+                                    <p:cond delay="0"/>
+                                  </p:stCondLst>
+                                  <p:childTnLst>
+                                    <p:set>
+                                      <p:cBhvr>
+                                        <p:cTn id="8" dur="1" fill="hold">
+                                          <p:stCondLst>
+                                            <p:cond delay="0"/>
+                                          </p:stCondLst>
+                                        </p:cTn>
+                                        <p:tgtEl>
+                                          <p:spTgt spid="3">
+                                            <p:txEl>
+                                              <p:pRg st="1" end="1"/>
+                                            </p:txEl>
+                                          </p:spTgt>
+                                        </p:tgtEl>
+                                        <p:attrNameLst>
+                                          <p:attrName>style.visibility</p:attrName>
+                                        </p:attrNameLst>
+                                      </p:cBhvr>
+                                      <p:to>
+                                        <p:strVal val="visible"/>
+                                      </p:to>
+                                    </p:set>
+                                  </p:childTnLst>
+                                </p:cTn>
+                              </p:par>
+                            </p:childTnLst>
+                          </p:cTn>
+                        </p:par>
+                      </p:childTnLst>
+                    </p:cTn>
+                  </p:par>
+                  <p:par>
+                    <p:cTn id="9" fill="hold">
+                      <p:stCondLst>
+                        <p:cond delay="indefinite"/>
+                      </p:stCondLst>
+                      <p:childTnLst>
+                        <p:par>
+                          <p:cTn id="10" fill="hold">
+                            <p:stCondLst>
+                              <p:cond delay="0"/>
+                            </p:stCondLst>
+                            <p:childTnLst>
+                              <p:par>
+                                <p:cTn id="11" presetID="1" presetClass="entr" presetSubtype="0" fill="hold" nodeType="clickEffect">
+                                  <p:stCondLst>
+                                    <p:cond delay="0"/>
+                                  </p:stCondLst>
+                                  <p:childTnLst>
+                                    <p:set>
+                                      <p:cBhvr>
+                                        <p:cTn id="12" dur="1" fill="hold">
+                                          <p:stCondLst>
+                                            <p:cond delay="0"/>
+                                          </p:stCondLst>
+                                        </p:cTn>
+                                        <p:tgtEl>
+                                          <p:spTgt spid="3">
+                                            <p:txEl>
+                                              <p:pRg st="2" end="2"/>
+                                            </p:txEl>
+                                          </p:spTgt>
+                                        </p:tgtEl>
+                                        <p:attrNameLst>
+                                          <p:attrName>style.visibility</p:attrName>
+                                        </p:attrNameLst>
+                                      </p:cBhvr>
+                                      <p:to>
+                                        <p:strVal val="visible"/>
+                                      </p:to>
+                                    </p:set>
+                                  </p:childTnLst>
+                                </p:cTn>
+                              </p:par>
+                              <p:par>
+                                <p:cTn id="13" presetID="1" presetClass="entr" presetSubtype="0" fill="hold" nodeType="withEffect">
+                                  <p:stCondLst>
+                                    <p:cond delay="0"/>
+                                  </p:stCondLst>
+                                  <p:childTnLst>
+                                    <p:set>
+                                      <p:cBhvr>
+                                        <p:cTn id="14" dur="1" fill="hold">
+                                          <p:stCondLst>
+                                            <p:cond delay="0"/>
+                                          </p:stCondLst>
+                                        </p:cTn>
+                                        <p:tgtEl>
+                                          <p:spTgt spid="3">
+                                            <p:txEl>
+                                              <p:pRg st="3" end="3"/>
+                                            </p:txEl>
+                                          </p:spTgt>
+                                        </p:tgtEl>
+                                        <p:attrNameLst>
+                                          <p:attrName>style.visibility</p:attrName>
+                                        </p:attrNameLst>
+                                      </p:cBhvr>
+                                      <p:to>
+                                        <p:strVal val="visible"/>
+                                      </p:to>
+                                    </p:set>
+                                  </p:childTnLst>
+                                </p:cTn>
+                              </p:par>
+                              <p:par>
+                                <p:cTn id="15" presetID="1" presetClass="entr" presetSubtype="0" fill="hold" nodeType="withEffect">
+                                  <p:stCondLst>
+                                    <p:cond delay="0"/>
+                                  </p:stCondLst>
+                                  <p:childTnLst>
+                                    <p:set>
+                                      <p:cBhvr>
+                                        <p:cTn id="16" dur="1" fill="hold">
+                                          <p:stCondLst>
+                                            <p:cond delay="0"/>
+                                          </p:stCondLst>
+                                        </p:cTn>
+                                        <p:tgtEl>
+                                          <p:spTgt spid="3">
+                                            <p:txEl>
+                                              <p:pRg st="4" end="4"/>
+                                            </p:txEl>
+                                          </p:spTgt>
+                                        </p:tgtEl>
+                                        <p:attrNameLst>
+                                          <p:attrName>style.visibility</p:attrName>
+                                        </p:attrNameLst>
+                                      </p:cBhvr>
+                                      <p:to>
+                                        <p:strVal val="visible"/>
+                                      </p:to>
+                                    </p:set>
+                                  </p:childTnLst>
+                                </p:cTn>
+                              </p:par>
+                              <p:par>
+                                <p:cTn id="17" presetID="1" presetClass="entr" presetSubtype="0" fill="hold" nodeType="withEffect">
+                                  <p:stCondLst>
+                                    <p:cond delay="0"/>
+                                  </p:stCondLst>
+                                  <p:childTnLst>
+                                    <p:set>
+                                      <p:cBhvr>
+                                        <p:cTn id="18" dur="1" fill="hold">
+                                          <p:stCondLst>
+                                            <p:cond delay="0"/>
+                                          </p:stCondLst>
+                                        </p:cTn>
+                                        <p:tgtEl>
+                                          <p:spTgt spid="3">
+                                            <p:txEl>
+                                              <p:pRg st="5" end="5"/>
+                                            </p:txEl>
+                                          </p:spTgt>
+                                        </p:tgtEl>
+                                        <p:attrNameLst>
+                                          <p:attrName>style.visibility</p:attrName>
+                                        </p:attrNameLst>
+                                      </p:cBhvr>
+                                      <p:to>
+                                        <p:strVal val="visible"/>
+                                      </p:to>
+                                    </p:set>
+                                  </p:childTnLst>
+                                </p:cTn>
+                              </p:par>
+                            </p:childTnLst>
+                          </p:cTn>
+                        </p:par>
+                      </p:childTnLst>
+                    </p:cTn>
+                  </p:par>
+                </p:childTnLst>
+              </p:cTn>
+              <p:prevCondLst>
+                <p:cond evt="onPrev" delay="0">
+                  <p:tgtEl>
+                    <p:sldTgt/>
+                  </p:tgtEl>
+                </p:cond>
+              </p:prevCondLst>
+              <p:nextCondLst>
+                <p:cond evt="onNext" delay="0">
+                  <p:tgtEl>
+                    <p:sldTgt/>
+                  </p:tgtEl>
+                </p:cond>
+              </p:nextCondLst>
+            </p:seq>
+          </p:childTnLst>
+        </p:cTn>
+      </p:par>
+    </p:tnLst>
+  </p:timing>
 </p:sld>
 </file>
 

</xml_diff>